<commit_message>
Update to Elm 0.19
This is a big change, encompassing a set of inter-dependent changes:

 - Upgrade to Elm 0.19
 - Providing an npm package to replace the missing websocket functionality
 - Streamlining and simplifying the Elm API
 - Providing a couple more sample apps

In addition, the Elm package repository seems to have forgotten about earlier
versions, and insists on this being 1.0.0 again. This means we have to delete
the earlier release tags from GitHub, and start again.
</commit_message>
<xml_diff>
--- a/docs/diagrams/design-diagrams.pptx
+++ b/docs/diagrams/design-diagrams.pptx
@@ -162,7 +162,7 @@
           </a:lstStyle>
           <a:p>
             <a:r>
-              <a:rPr lang="en-US" smtClean="0"/>
+              <a:rPr lang="en-US"/>
               <a:t>Click to edit Master title style</a:t>
             </a:r>
             <a:endParaRPr lang="en-GB"/>
@@ -227,7 +227,7 @@
           </a:lstStyle>
           <a:p>
             <a:r>
-              <a:rPr lang="en-US" smtClean="0"/>
+              <a:rPr lang="en-US"/>
               <a:t>Click to edit Master subtitle style</a:t>
             </a:r>
             <a:endParaRPr lang="en-GB"/>
@@ -251,7 +251,7 @@
           <a:p>
             <a:fld id="{F8042829-7A5E-4E83-9E74-05297A669D13}" type="datetimeFigureOut">
               <a:rPr lang="en-GB" smtClean="0"/>
-              <a:t>04/08/2017</a:t>
+              <a:t>11/04/2019</a:t>
             </a:fld>
             <a:endParaRPr lang="en-GB"/>
           </a:p>
@@ -345,7 +345,7 @@
           <a:lstStyle/>
           <a:p>
             <a:r>
-              <a:rPr lang="en-US" smtClean="0"/>
+              <a:rPr lang="en-US"/>
               <a:t>Click to edit Master title style</a:t>
             </a:r>
             <a:endParaRPr lang="en-GB"/>
@@ -369,35 +369,35 @@
           <a:p>
             <a:pPr lvl="0"/>
             <a:r>
-              <a:rPr lang="en-US" smtClean="0"/>
+              <a:rPr lang="en-US"/>
               <a:t>Edit Master text styles</a:t>
             </a:r>
           </a:p>
           <a:p>
             <a:pPr lvl="1"/>
             <a:r>
-              <a:rPr lang="en-US" smtClean="0"/>
+              <a:rPr lang="en-US"/>
               <a:t>Second level</a:t>
             </a:r>
           </a:p>
           <a:p>
             <a:pPr lvl="2"/>
             <a:r>
-              <a:rPr lang="en-US" smtClean="0"/>
+              <a:rPr lang="en-US"/>
               <a:t>Third level</a:t>
             </a:r>
           </a:p>
           <a:p>
             <a:pPr lvl="3"/>
             <a:r>
-              <a:rPr lang="en-US" smtClean="0"/>
+              <a:rPr lang="en-US"/>
               <a:t>Fourth level</a:t>
             </a:r>
           </a:p>
           <a:p>
             <a:pPr lvl="4"/>
             <a:r>
-              <a:rPr lang="en-US" smtClean="0"/>
+              <a:rPr lang="en-US"/>
               <a:t>Fifth level</a:t>
             </a:r>
             <a:endParaRPr lang="en-GB"/>
@@ -421,7 +421,7 @@
           <a:p>
             <a:fld id="{F8042829-7A5E-4E83-9E74-05297A669D13}" type="datetimeFigureOut">
               <a:rPr lang="en-GB" smtClean="0"/>
-              <a:t>04/08/2017</a:t>
+              <a:t>11/04/2019</a:t>
             </a:fld>
             <a:endParaRPr lang="en-GB"/>
           </a:p>
@@ -520,7 +520,7 @@
           <a:lstStyle/>
           <a:p>
             <a:r>
-              <a:rPr lang="en-US" smtClean="0"/>
+              <a:rPr lang="en-US"/>
               <a:t>Click to edit Master title style</a:t>
             </a:r>
             <a:endParaRPr lang="en-GB"/>
@@ -549,35 +549,35 @@
           <a:p>
             <a:pPr lvl="0"/>
             <a:r>
-              <a:rPr lang="en-US" smtClean="0"/>
+              <a:rPr lang="en-US"/>
               <a:t>Edit Master text styles</a:t>
             </a:r>
           </a:p>
           <a:p>
             <a:pPr lvl="1"/>
             <a:r>
-              <a:rPr lang="en-US" smtClean="0"/>
+              <a:rPr lang="en-US"/>
               <a:t>Second level</a:t>
             </a:r>
           </a:p>
           <a:p>
             <a:pPr lvl="2"/>
             <a:r>
-              <a:rPr lang="en-US" smtClean="0"/>
+              <a:rPr lang="en-US"/>
               <a:t>Third level</a:t>
             </a:r>
           </a:p>
           <a:p>
             <a:pPr lvl="3"/>
             <a:r>
-              <a:rPr lang="en-US" smtClean="0"/>
+              <a:rPr lang="en-US"/>
               <a:t>Fourth level</a:t>
             </a:r>
           </a:p>
           <a:p>
             <a:pPr lvl="4"/>
             <a:r>
-              <a:rPr lang="en-US" smtClean="0"/>
+              <a:rPr lang="en-US"/>
               <a:t>Fifth level</a:t>
             </a:r>
             <a:endParaRPr lang="en-GB"/>
@@ -601,7 +601,7 @@
           <a:p>
             <a:fld id="{F8042829-7A5E-4E83-9E74-05297A669D13}" type="datetimeFigureOut">
               <a:rPr lang="en-GB" smtClean="0"/>
-              <a:t>04/08/2017</a:t>
+              <a:t>11/04/2019</a:t>
             </a:fld>
             <a:endParaRPr lang="en-GB"/>
           </a:p>
@@ -695,7 +695,7 @@
           <a:lstStyle/>
           <a:p>
             <a:r>
-              <a:rPr lang="en-US" smtClean="0"/>
+              <a:rPr lang="en-US"/>
               <a:t>Click to edit Master title style</a:t>
             </a:r>
             <a:endParaRPr lang="en-GB"/>
@@ -719,35 +719,35 @@
           <a:p>
             <a:pPr lvl="0"/>
             <a:r>
-              <a:rPr lang="en-US" smtClean="0"/>
+              <a:rPr lang="en-US"/>
               <a:t>Edit Master text styles</a:t>
             </a:r>
           </a:p>
           <a:p>
             <a:pPr lvl="1"/>
             <a:r>
-              <a:rPr lang="en-US" smtClean="0"/>
+              <a:rPr lang="en-US"/>
               <a:t>Second level</a:t>
             </a:r>
           </a:p>
           <a:p>
             <a:pPr lvl="2"/>
             <a:r>
-              <a:rPr lang="en-US" smtClean="0"/>
+              <a:rPr lang="en-US"/>
               <a:t>Third level</a:t>
             </a:r>
           </a:p>
           <a:p>
             <a:pPr lvl="3"/>
             <a:r>
-              <a:rPr lang="en-US" smtClean="0"/>
+              <a:rPr lang="en-US"/>
               <a:t>Fourth level</a:t>
             </a:r>
           </a:p>
           <a:p>
             <a:pPr lvl="4"/>
             <a:r>
-              <a:rPr lang="en-US" smtClean="0"/>
+              <a:rPr lang="en-US"/>
               <a:t>Fifth level</a:t>
             </a:r>
             <a:endParaRPr lang="en-GB"/>
@@ -771,7 +771,7 @@
           <a:p>
             <a:fld id="{F8042829-7A5E-4E83-9E74-05297A669D13}" type="datetimeFigureOut">
               <a:rPr lang="en-GB" smtClean="0"/>
-              <a:t>04/08/2017</a:t>
+              <a:t>11/04/2019</a:t>
             </a:fld>
             <a:endParaRPr lang="en-GB"/>
           </a:p>
@@ -874,7 +874,7 @@
           </a:lstStyle>
           <a:p>
             <a:r>
-              <a:rPr lang="en-US" smtClean="0"/>
+              <a:rPr lang="en-US"/>
               <a:t>Click to edit Master title style</a:t>
             </a:r>
             <a:endParaRPr lang="en-GB"/>
@@ -994,7 +994,7 @@
           <a:p>
             <a:pPr lvl="0"/>
             <a:r>
-              <a:rPr lang="en-US" smtClean="0"/>
+              <a:rPr lang="en-US"/>
               <a:t>Edit Master text styles</a:t>
             </a:r>
           </a:p>
@@ -1017,7 +1017,7 @@
           <a:p>
             <a:fld id="{F8042829-7A5E-4E83-9E74-05297A669D13}" type="datetimeFigureOut">
               <a:rPr lang="en-GB" smtClean="0"/>
-              <a:t>04/08/2017</a:t>
+              <a:t>11/04/2019</a:t>
             </a:fld>
             <a:endParaRPr lang="en-GB"/>
           </a:p>
@@ -1111,7 +1111,7 @@
           <a:lstStyle/>
           <a:p>
             <a:r>
-              <a:rPr lang="en-US" smtClean="0"/>
+              <a:rPr lang="en-US"/>
               <a:t>Click to edit Master title style</a:t>
             </a:r>
             <a:endParaRPr lang="en-GB"/>
@@ -1140,35 +1140,35 @@
           <a:p>
             <a:pPr lvl="0"/>
             <a:r>
-              <a:rPr lang="en-US" smtClean="0"/>
+              <a:rPr lang="en-US"/>
               <a:t>Edit Master text styles</a:t>
             </a:r>
           </a:p>
           <a:p>
             <a:pPr lvl="1"/>
             <a:r>
-              <a:rPr lang="en-US" smtClean="0"/>
+              <a:rPr lang="en-US"/>
               <a:t>Second level</a:t>
             </a:r>
           </a:p>
           <a:p>
             <a:pPr lvl="2"/>
             <a:r>
-              <a:rPr lang="en-US" smtClean="0"/>
+              <a:rPr lang="en-US"/>
               <a:t>Third level</a:t>
             </a:r>
           </a:p>
           <a:p>
             <a:pPr lvl="3"/>
             <a:r>
-              <a:rPr lang="en-US" smtClean="0"/>
+              <a:rPr lang="en-US"/>
               <a:t>Fourth level</a:t>
             </a:r>
           </a:p>
           <a:p>
             <a:pPr lvl="4"/>
             <a:r>
-              <a:rPr lang="en-US" smtClean="0"/>
+              <a:rPr lang="en-US"/>
               <a:t>Fifth level</a:t>
             </a:r>
             <a:endParaRPr lang="en-GB"/>
@@ -1197,35 +1197,35 @@
           <a:p>
             <a:pPr lvl="0"/>
             <a:r>
-              <a:rPr lang="en-US" smtClean="0"/>
+              <a:rPr lang="en-US"/>
               <a:t>Edit Master text styles</a:t>
             </a:r>
           </a:p>
           <a:p>
             <a:pPr lvl="1"/>
             <a:r>
-              <a:rPr lang="en-US" smtClean="0"/>
+              <a:rPr lang="en-US"/>
               <a:t>Second level</a:t>
             </a:r>
           </a:p>
           <a:p>
             <a:pPr lvl="2"/>
             <a:r>
-              <a:rPr lang="en-US" smtClean="0"/>
+              <a:rPr lang="en-US"/>
               <a:t>Third level</a:t>
             </a:r>
           </a:p>
           <a:p>
             <a:pPr lvl="3"/>
             <a:r>
-              <a:rPr lang="en-US" smtClean="0"/>
+              <a:rPr lang="en-US"/>
               <a:t>Fourth level</a:t>
             </a:r>
           </a:p>
           <a:p>
             <a:pPr lvl="4"/>
             <a:r>
-              <a:rPr lang="en-US" smtClean="0"/>
+              <a:rPr lang="en-US"/>
               <a:t>Fifth level</a:t>
             </a:r>
             <a:endParaRPr lang="en-GB"/>
@@ -1249,7 +1249,7 @@
           <a:p>
             <a:fld id="{F8042829-7A5E-4E83-9E74-05297A669D13}" type="datetimeFigureOut">
               <a:rPr lang="en-GB" smtClean="0"/>
-              <a:t>04/08/2017</a:t>
+              <a:t>11/04/2019</a:t>
             </a:fld>
             <a:endParaRPr lang="en-GB"/>
           </a:p>
@@ -1348,7 +1348,7 @@
           <a:lstStyle/>
           <a:p>
             <a:r>
-              <a:rPr lang="en-US" smtClean="0"/>
+              <a:rPr lang="en-US"/>
               <a:t>Click to edit Master title style</a:t>
             </a:r>
             <a:endParaRPr lang="en-GB"/>
@@ -1414,7 +1414,7 @@
           <a:p>
             <a:pPr lvl="0"/>
             <a:r>
-              <a:rPr lang="en-US" smtClean="0"/>
+              <a:rPr lang="en-US"/>
               <a:t>Edit Master text styles</a:t>
             </a:r>
           </a:p>
@@ -1442,35 +1442,35 @@
           <a:p>
             <a:pPr lvl="0"/>
             <a:r>
-              <a:rPr lang="en-US" smtClean="0"/>
+              <a:rPr lang="en-US"/>
               <a:t>Edit Master text styles</a:t>
             </a:r>
           </a:p>
           <a:p>
             <a:pPr lvl="1"/>
             <a:r>
-              <a:rPr lang="en-US" smtClean="0"/>
+              <a:rPr lang="en-US"/>
               <a:t>Second level</a:t>
             </a:r>
           </a:p>
           <a:p>
             <a:pPr lvl="2"/>
             <a:r>
-              <a:rPr lang="en-US" smtClean="0"/>
+              <a:rPr lang="en-US"/>
               <a:t>Third level</a:t>
             </a:r>
           </a:p>
           <a:p>
             <a:pPr lvl="3"/>
             <a:r>
-              <a:rPr lang="en-US" smtClean="0"/>
+              <a:rPr lang="en-US"/>
               <a:t>Fourth level</a:t>
             </a:r>
           </a:p>
           <a:p>
             <a:pPr lvl="4"/>
             <a:r>
-              <a:rPr lang="en-US" smtClean="0"/>
+              <a:rPr lang="en-US"/>
               <a:t>Fifth level</a:t>
             </a:r>
             <a:endParaRPr lang="en-GB"/>
@@ -1536,7 +1536,7 @@
           <a:p>
             <a:pPr lvl="0"/>
             <a:r>
-              <a:rPr lang="en-US" smtClean="0"/>
+              <a:rPr lang="en-US"/>
               <a:t>Edit Master text styles</a:t>
             </a:r>
           </a:p>
@@ -1564,35 +1564,35 @@
           <a:p>
             <a:pPr lvl="0"/>
             <a:r>
-              <a:rPr lang="en-US" smtClean="0"/>
+              <a:rPr lang="en-US"/>
               <a:t>Edit Master text styles</a:t>
             </a:r>
           </a:p>
           <a:p>
             <a:pPr lvl="1"/>
             <a:r>
-              <a:rPr lang="en-US" smtClean="0"/>
+              <a:rPr lang="en-US"/>
               <a:t>Second level</a:t>
             </a:r>
           </a:p>
           <a:p>
             <a:pPr lvl="2"/>
             <a:r>
-              <a:rPr lang="en-US" smtClean="0"/>
+              <a:rPr lang="en-US"/>
               <a:t>Third level</a:t>
             </a:r>
           </a:p>
           <a:p>
             <a:pPr lvl="3"/>
             <a:r>
-              <a:rPr lang="en-US" smtClean="0"/>
+              <a:rPr lang="en-US"/>
               <a:t>Fourth level</a:t>
             </a:r>
           </a:p>
           <a:p>
             <a:pPr lvl="4"/>
             <a:r>
-              <a:rPr lang="en-US" smtClean="0"/>
+              <a:rPr lang="en-US"/>
               <a:t>Fifth level</a:t>
             </a:r>
             <a:endParaRPr lang="en-GB"/>
@@ -1616,7 +1616,7 @@
           <a:p>
             <a:fld id="{F8042829-7A5E-4E83-9E74-05297A669D13}" type="datetimeFigureOut">
               <a:rPr lang="en-GB" smtClean="0"/>
-              <a:t>04/08/2017</a:t>
+              <a:t>11/04/2019</a:t>
             </a:fld>
             <a:endParaRPr lang="en-GB"/>
           </a:p>
@@ -1710,7 +1710,7 @@
           <a:lstStyle/>
           <a:p>
             <a:r>
-              <a:rPr lang="en-US" smtClean="0"/>
+              <a:rPr lang="en-US"/>
               <a:t>Click to edit Master title style</a:t>
             </a:r>
             <a:endParaRPr lang="en-GB"/>
@@ -1734,7 +1734,7 @@
           <a:p>
             <a:fld id="{F8042829-7A5E-4E83-9E74-05297A669D13}" type="datetimeFigureOut">
               <a:rPr lang="en-GB" smtClean="0"/>
-              <a:t>04/08/2017</a:t>
+              <a:t>11/04/2019</a:t>
             </a:fld>
             <a:endParaRPr lang="en-GB"/>
           </a:p>
@@ -1829,7 +1829,7 @@
           <a:p>
             <a:fld id="{F8042829-7A5E-4E83-9E74-05297A669D13}" type="datetimeFigureOut">
               <a:rPr lang="en-GB" smtClean="0"/>
-              <a:t>04/08/2017</a:t>
+              <a:t>11/04/2019</a:t>
             </a:fld>
             <a:endParaRPr lang="en-GB"/>
           </a:p>
@@ -1932,7 +1932,7 @@
           </a:lstStyle>
           <a:p>
             <a:r>
-              <a:rPr lang="en-US" smtClean="0"/>
+              <a:rPr lang="en-US"/>
               <a:t>Click to edit Master title style</a:t>
             </a:r>
             <a:endParaRPr lang="en-GB"/>
@@ -1989,35 +1989,35 @@
           <a:p>
             <a:pPr lvl="0"/>
             <a:r>
-              <a:rPr lang="en-US" smtClean="0"/>
+              <a:rPr lang="en-US"/>
               <a:t>Edit Master text styles</a:t>
             </a:r>
           </a:p>
           <a:p>
             <a:pPr lvl="1"/>
             <a:r>
-              <a:rPr lang="en-US" smtClean="0"/>
+              <a:rPr lang="en-US"/>
               <a:t>Second level</a:t>
             </a:r>
           </a:p>
           <a:p>
             <a:pPr lvl="2"/>
             <a:r>
-              <a:rPr lang="en-US" smtClean="0"/>
+              <a:rPr lang="en-US"/>
               <a:t>Third level</a:t>
             </a:r>
           </a:p>
           <a:p>
             <a:pPr lvl="3"/>
             <a:r>
-              <a:rPr lang="en-US" smtClean="0"/>
+              <a:rPr lang="en-US"/>
               <a:t>Fourth level</a:t>
             </a:r>
           </a:p>
           <a:p>
             <a:pPr lvl="4"/>
             <a:r>
-              <a:rPr lang="en-US" smtClean="0"/>
+              <a:rPr lang="en-US"/>
               <a:t>Fifth level</a:t>
             </a:r>
             <a:endParaRPr lang="en-GB"/>
@@ -2083,7 +2083,7 @@
           <a:p>
             <a:pPr lvl="0"/>
             <a:r>
-              <a:rPr lang="en-US" smtClean="0"/>
+              <a:rPr lang="en-US"/>
               <a:t>Edit Master text styles</a:t>
             </a:r>
           </a:p>
@@ -2106,7 +2106,7 @@
           <a:p>
             <a:fld id="{F8042829-7A5E-4E83-9E74-05297A669D13}" type="datetimeFigureOut">
               <a:rPr lang="en-GB" smtClean="0"/>
-              <a:t>04/08/2017</a:t>
+              <a:t>11/04/2019</a:t>
             </a:fld>
             <a:endParaRPr lang="en-GB"/>
           </a:p>
@@ -2209,7 +2209,7 @@
           </a:lstStyle>
           <a:p>
             <a:r>
-              <a:rPr lang="en-US" smtClean="0"/>
+              <a:rPr lang="en-US"/>
               <a:t>Click to edit Master title style</a:t>
             </a:r>
             <a:endParaRPr lang="en-GB"/>
@@ -2336,7 +2336,7 @@
           <a:p>
             <a:pPr lvl="0"/>
             <a:r>
-              <a:rPr lang="en-US" smtClean="0"/>
+              <a:rPr lang="en-US"/>
               <a:t>Edit Master text styles</a:t>
             </a:r>
           </a:p>
@@ -2359,7 +2359,7 @@
           <a:p>
             <a:fld id="{F8042829-7A5E-4E83-9E74-05297A669D13}" type="datetimeFigureOut">
               <a:rPr lang="en-GB" smtClean="0"/>
-              <a:t>04/08/2017</a:t>
+              <a:t>11/04/2019</a:t>
             </a:fld>
             <a:endParaRPr lang="en-GB"/>
           </a:p>
@@ -2468,7 +2468,7 @@
           <a:lstStyle/>
           <a:p>
             <a:r>
-              <a:rPr lang="en-US" smtClean="0"/>
+              <a:rPr lang="en-US"/>
               <a:t>Click to edit Master title style</a:t>
             </a:r>
             <a:endParaRPr lang="en-GB"/>
@@ -2502,35 +2502,35 @@
           <a:p>
             <a:pPr lvl="0"/>
             <a:r>
-              <a:rPr lang="en-US" smtClean="0"/>
+              <a:rPr lang="en-US"/>
               <a:t>Edit Master text styles</a:t>
             </a:r>
           </a:p>
           <a:p>
             <a:pPr lvl="1"/>
             <a:r>
-              <a:rPr lang="en-US" smtClean="0"/>
+              <a:rPr lang="en-US"/>
               <a:t>Second level</a:t>
             </a:r>
           </a:p>
           <a:p>
             <a:pPr lvl="2"/>
             <a:r>
-              <a:rPr lang="en-US" smtClean="0"/>
+              <a:rPr lang="en-US"/>
               <a:t>Third level</a:t>
             </a:r>
           </a:p>
           <a:p>
             <a:pPr lvl="3"/>
             <a:r>
-              <a:rPr lang="en-US" smtClean="0"/>
+              <a:rPr lang="en-US"/>
               <a:t>Fourth level</a:t>
             </a:r>
           </a:p>
           <a:p>
             <a:pPr lvl="4"/>
             <a:r>
-              <a:rPr lang="en-US" smtClean="0"/>
+              <a:rPr lang="en-US"/>
               <a:t>Fifth level</a:t>
             </a:r>
             <a:endParaRPr lang="en-GB"/>
@@ -2572,7 +2572,7 @@
           <a:p>
             <a:fld id="{F8042829-7A5E-4E83-9E74-05297A669D13}" type="datetimeFigureOut">
               <a:rPr lang="en-GB" smtClean="0"/>
-              <a:t>04/08/2017</a:t>
+              <a:t>11/04/2019</a:t>
             </a:fld>
             <a:endParaRPr lang="en-GB"/>
           </a:p>
@@ -3013,7 +3013,7 @@
           <a:p>
             <a:pPr algn="ctr"/>
             <a:r>
-              <a:rPr lang="en-GB" dirty="0" smtClean="0">
+              <a:rPr lang="en-GB" dirty="0">
                 <a:solidFill>
                   <a:schemeClr val="accent1">
                     <a:lumMod val="75000"/>
@@ -3022,13 +3022,6 @@
               </a:rPr>
               <a:t>Web browser</a:t>
             </a:r>
-            <a:endParaRPr lang="en-GB" dirty="0">
-              <a:solidFill>
-                <a:schemeClr val="accent1">
-                  <a:lumMod val="75000"/>
-                </a:schemeClr>
-              </a:solidFill>
-            </a:endParaRPr>
           </a:p>
         </p:txBody>
       </p:sp>
@@ -3068,7 +3061,7 @@
           <a:p>
             <a:pPr algn="ctr"/>
             <a:r>
-              <a:rPr lang="en-GB" dirty="0" smtClean="0">
+              <a:rPr lang="en-GB" dirty="0">
                 <a:solidFill>
                   <a:schemeClr val="accent2">
                     <a:lumMod val="75000"/>
@@ -3077,13 +3070,6 @@
               </a:rPr>
               <a:t>Python3 process</a:t>
             </a:r>
-            <a:endParaRPr lang="en-GB" dirty="0">
-              <a:solidFill>
-                <a:schemeClr val="accent2">
-                  <a:lumMod val="75000"/>
-                </a:schemeClr>
-              </a:solidFill>
-            </a:endParaRPr>
           </a:p>
         </p:txBody>
       </p:sp>
@@ -3137,7 +3123,7 @@
           <a:p>
             <a:pPr algn="ctr"/>
             <a:r>
-              <a:rPr lang="en-GB" dirty="0" err="1" smtClean="0">
+              <a:rPr lang="en-GB" dirty="0" err="1">
                 <a:solidFill>
                   <a:schemeClr val="accent6">
                     <a:lumMod val="50000"/>
@@ -3187,18 +3173,13 @@
           <a:p>
             <a:pPr algn="ctr"/>
             <a:r>
-              <a:rPr lang="en-GB" dirty="0" smtClean="0">
+              <a:rPr lang="en-GB" dirty="0">
                 <a:solidFill>
                   <a:schemeClr val="bg1"/>
                 </a:solidFill>
               </a:rPr>
               <a:t>Client code (Elm)</a:t>
             </a:r>
-            <a:endParaRPr lang="en-GB" dirty="0">
-              <a:solidFill>
-                <a:schemeClr val="bg1"/>
-              </a:solidFill>
-            </a:endParaRPr>
           </a:p>
         </p:txBody>
       </p:sp>
@@ -3231,18 +3212,13 @@
           <a:p>
             <a:pPr algn="ctr"/>
             <a:r>
-              <a:rPr lang="en-GB" dirty="0" smtClean="0">
+              <a:rPr lang="en-GB" dirty="0">
                 <a:solidFill>
                   <a:schemeClr val="bg1"/>
                 </a:solidFill>
               </a:rPr>
               <a:t>Server code (Python)</a:t>
             </a:r>
-            <a:endParaRPr lang="en-GB" dirty="0">
-              <a:solidFill>
-                <a:schemeClr val="bg1"/>
-              </a:solidFill>
-            </a:endParaRPr>
           </a:p>
         </p:txBody>
       </p:sp>
@@ -3311,7 +3287,7 @@
           <a:lstStyle/>
           <a:p>
             <a:r>
-              <a:rPr lang="en-GB" dirty="0" smtClean="0">
+              <a:rPr lang="en-GB" dirty="0">
                 <a:solidFill>
                   <a:schemeClr val="accent1">
                     <a:lumMod val="50000"/>
@@ -3320,13 +3296,6 @@
               </a:rPr>
               <a:t>User</a:t>
             </a:r>
-            <a:endParaRPr lang="en-GB" dirty="0">
-              <a:solidFill>
-                <a:schemeClr val="accent1">
-                  <a:lumMod val="50000"/>
-                </a:schemeClr>
-              </a:solidFill>
-            </a:endParaRPr>
           </a:p>
         </p:txBody>
       </p:sp>
@@ -3512,7 +3481,7 @@
           <a:p>
             <a:pPr algn="ctr"/>
             <a:r>
-              <a:rPr lang="en-GB" dirty="0" smtClean="0">
+              <a:rPr lang="en-GB" dirty="0">
                 <a:solidFill>
                   <a:schemeClr val="accent2">
                     <a:lumMod val="75000"/>
@@ -3522,7 +3491,7 @@
               <a:t>Other services (</a:t>
             </a:r>
             <a:r>
-              <a:rPr lang="en-GB" dirty="0" err="1" smtClean="0">
+              <a:rPr lang="en-GB" dirty="0" err="1">
                 <a:solidFill>
                   <a:schemeClr val="accent2">
                     <a:lumMod val="75000"/>
@@ -3530,26 +3499,6 @@
                 </a:solidFill>
               </a:rPr>
               <a:t>eg</a:t>
-            </a:r>
-            <a:endParaRPr lang="en-GB" dirty="0" smtClean="0">
-              <a:solidFill>
-                <a:schemeClr val="accent2">
-                  <a:lumMod val="75000"/>
-                </a:schemeClr>
-              </a:solidFill>
-            </a:endParaRPr>
-          </a:p>
-          <a:p>
-            <a:pPr algn="ctr"/>
-            <a:r>
-              <a:rPr lang="en-GB" dirty="0" smtClean="0">
-                <a:solidFill>
-                  <a:schemeClr val="accent2">
-                    <a:lumMod val="75000"/>
-                  </a:schemeClr>
-                </a:solidFill>
-              </a:rPr>
-              <a:t>router connections)</a:t>
             </a:r>
             <a:endParaRPr lang="en-GB" dirty="0">
               <a:solidFill>
@@ -3558,6 +3507,19 @@
                 </a:schemeClr>
               </a:solidFill>
             </a:endParaRPr>
+          </a:p>
+          <a:p>
+            <a:pPr algn="ctr"/>
+            <a:r>
+              <a:rPr lang="en-GB" dirty="0">
+                <a:solidFill>
+                  <a:schemeClr val="accent2">
+                    <a:lumMod val="75000"/>
+                  </a:schemeClr>
+                </a:solidFill>
+              </a:rPr>
+              <a:t>router connections)</a:t>
+            </a:r>
           </a:p>
         </p:txBody>
       </p:sp>
@@ -3571,13 +3533,6 @@
   <p:clrMapOvr>
     <a:masterClrMapping/>
   </p:clrMapOvr>
-  <p:timing>
-    <p:tnLst>
-      <p:par>
-        <p:cTn id="1" dur="indefinite" restart="never" nodeType="tmRoot"/>
-      </p:par>
-    </p:tnLst>
-  </p:timing>
 </p:sld>
 </file>
 
@@ -3633,7 +3588,7 @@
           <a:lstStyle/>
           <a:p>
             <a:r>
-              <a:rPr lang="en-GB" dirty="0" smtClean="0">
+              <a:rPr lang="en-GB" dirty="0">
                 <a:solidFill>
                   <a:schemeClr val="accent2">
                     <a:lumMod val="50000"/>
@@ -3642,13 +3597,6 @@
               </a:rPr>
               <a:t>Server</a:t>
             </a:r>
-            <a:endParaRPr lang="en-GB" dirty="0">
-              <a:solidFill>
-                <a:schemeClr val="accent2">
-                  <a:lumMod val="50000"/>
-                </a:schemeClr>
-              </a:solidFill>
-            </a:endParaRPr>
           </a:p>
         </p:txBody>
       </p:sp>
@@ -3702,7 +3650,7 @@
           <a:p>
             <a:pPr algn="ctr"/>
             <a:r>
-              <a:rPr lang="en-GB" dirty="0" err="1" smtClean="0">
+              <a:rPr lang="en-GB" dirty="0" err="1">
                 <a:solidFill>
                   <a:schemeClr val="accent6">
                     <a:lumMod val="50000"/>
@@ -3752,18 +3700,13 @@
           <a:p>
             <a:pPr algn="ctr"/>
             <a:r>
-              <a:rPr lang="en-GB" dirty="0" smtClean="0">
+              <a:rPr lang="en-GB" dirty="0">
                 <a:solidFill>
                   <a:schemeClr val="bg1"/>
                 </a:solidFill>
               </a:rPr>
               <a:t>Client</a:t>
             </a:r>
-            <a:endParaRPr lang="en-GB" dirty="0">
-              <a:solidFill>
-                <a:schemeClr val="bg1"/>
-              </a:solidFill>
-            </a:endParaRPr>
           </a:p>
         </p:txBody>
       </p:sp>
@@ -3815,7 +3758,7 @@
           <a:p>
             <a:pPr algn="ctr"/>
             <a:r>
-              <a:rPr lang="en-GB" sz="1400" dirty="0" err="1" smtClean="0">
+              <a:rPr lang="en-GB" sz="1400" dirty="0" err="1">
                 <a:solidFill>
                   <a:schemeClr val="accent2">
                     <a:lumMod val="50000"/>
@@ -3825,7 +3768,7 @@
               <a:t>Websocket</a:t>
             </a:r>
             <a:r>
-              <a:rPr lang="en-GB" sz="1400" dirty="0" smtClean="0">
+              <a:rPr lang="en-GB" sz="1400" dirty="0">
                 <a:solidFill>
                   <a:schemeClr val="accent2">
                     <a:lumMod val="50000"/>
@@ -3838,7 +3781,7 @@
           <a:p>
             <a:pPr algn="ctr"/>
             <a:r>
-              <a:rPr lang="en-GB" sz="1400" dirty="0" smtClean="0">
+              <a:rPr lang="en-GB" sz="1400" dirty="0">
                 <a:solidFill>
                   <a:schemeClr val="accent2">
                     <a:lumMod val="50000"/>
@@ -3847,13 +3790,6 @@
               </a:rPr>
               <a:t>handler</a:t>
             </a:r>
-            <a:endParaRPr lang="en-GB" sz="1400" dirty="0">
-              <a:solidFill>
-                <a:schemeClr val="accent2">
-                  <a:lumMod val="50000"/>
-                </a:schemeClr>
-              </a:solidFill>
-            </a:endParaRPr>
           </a:p>
         </p:txBody>
       </p:sp>
@@ -3905,7 +3841,7 @@
           <a:p>
             <a:pPr algn="ctr"/>
             <a:r>
-              <a:rPr lang="en-GB" sz="1400" dirty="0" smtClean="0">
+              <a:rPr lang="en-GB" sz="1400" dirty="0">
                 <a:solidFill>
                   <a:schemeClr val="accent2">
                     <a:lumMod val="50000"/>
@@ -3914,13 +3850,6 @@
               </a:rPr>
               <a:t>Feature1</a:t>
             </a:r>
-            <a:endParaRPr lang="en-GB" sz="1400" dirty="0">
-              <a:solidFill>
-                <a:schemeClr val="accent2">
-                  <a:lumMod val="50000"/>
-                </a:schemeClr>
-              </a:solidFill>
-            </a:endParaRPr>
           </a:p>
         </p:txBody>
       </p:sp>
@@ -3972,7 +3901,7 @@
           <a:p>
             <a:pPr algn="ctr"/>
             <a:r>
-              <a:rPr lang="en-GB" sz="1400" dirty="0" smtClean="0">
+              <a:rPr lang="en-GB" sz="1400" dirty="0">
                 <a:solidFill>
                   <a:schemeClr val="accent2">
                     <a:lumMod val="50000"/>
@@ -3981,13 +3910,6 @@
               </a:rPr>
               <a:t>Feature2</a:t>
             </a:r>
-            <a:endParaRPr lang="en-GB" sz="1400" dirty="0">
-              <a:solidFill>
-                <a:schemeClr val="accent2">
-                  <a:lumMod val="50000"/>
-                </a:schemeClr>
-              </a:solidFill>
-            </a:endParaRPr>
           </a:p>
         </p:txBody>
       </p:sp>
@@ -4039,7 +3961,7 @@
           <a:p>
             <a:pPr algn="ctr"/>
             <a:r>
-              <a:rPr lang="en-GB" sz="1400" dirty="0" smtClean="0">
+              <a:rPr lang="en-GB" sz="1400" dirty="0">
                 <a:solidFill>
                   <a:schemeClr val="accent2">
                     <a:lumMod val="50000"/>
@@ -4048,13 +3970,6 @@
               </a:rPr>
               <a:t>Feature3</a:t>
             </a:r>
-            <a:endParaRPr lang="en-GB" sz="1400" dirty="0">
-              <a:solidFill>
-                <a:schemeClr val="accent2">
-                  <a:lumMod val="50000"/>
-                </a:schemeClr>
-              </a:solidFill>
-            </a:endParaRPr>
           </a:p>
         </p:txBody>
       </p:sp>
@@ -4252,7 +4167,7 @@
           <a:lstStyle/>
           <a:p>
             <a:r>
-              <a:rPr lang="en-GB" sz="1600" dirty="0" smtClean="0">
+              <a:rPr lang="en-GB" sz="1600" dirty="0">
                 <a:solidFill>
                   <a:srgbClr val="7030A0"/>
                 </a:solidFill>
@@ -4260,7 +4175,7 @@
               <a:t>Request </a:t>
             </a:r>
             <a:r>
-              <a:rPr lang="en-GB" sz="1600" dirty="0" err="1" smtClean="0">
+              <a:rPr lang="en-GB" sz="1600" dirty="0" err="1">
                 <a:solidFill>
                   <a:srgbClr val="7030A0"/>
                 </a:solidFill>
@@ -4268,7 +4183,7 @@
               <a:t>demux</a:t>
             </a:r>
             <a:r>
-              <a:rPr lang="en-GB" sz="1600" dirty="0" smtClean="0">
+              <a:rPr lang="en-GB" sz="1600" dirty="0">
                 <a:solidFill>
                   <a:srgbClr val="7030A0"/>
                 </a:solidFill>
@@ -4278,7 +4193,7 @@
           </a:p>
           <a:p>
             <a:r>
-              <a:rPr lang="en-GB" sz="1600" dirty="0" smtClean="0">
+              <a:rPr lang="en-GB" sz="1600" dirty="0">
                 <a:solidFill>
                   <a:srgbClr val="7030A0"/>
                 </a:solidFill>
@@ -4286,7 +4201,7 @@
               <a:t>off </a:t>
             </a:r>
             <a:r>
-              <a:rPr lang="en-GB" sz="1600" dirty="0" err="1" smtClean="0">
+              <a:rPr lang="en-GB" sz="1600" dirty="0" err="1">
                 <a:solidFill>
                   <a:srgbClr val="7030A0"/>
                 </a:solidFill>
@@ -4301,20 +4216,12 @@
                   <a:srgbClr val="7030A0"/>
                 </a:solidFill>
               </a:rPr>
-              <a:t> </a:t>
-            </a:r>
-            <a:r>
-              <a:rPr lang="en-GB" sz="1600" dirty="0" smtClean="0">
-                <a:solidFill>
-                  <a:srgbClr val="7030A0"/>
-                </a:solidFill>
-              </a:rPr>
-              <a:t>value</a:t>
-            </a:r>
-          </a:p>
-          <a:p>
-            <a:r>
-              <a:rPr lang="en-GB" sz="1100" dirty="0" smtClean="0">
+              <a:t> value</a:t>
+            </a:r>
+          </a:p>
+          <a:p>
+            <a:r>
+              <a:rPr lang="en-GB" sz="1100" dirty="0">
                 <a:solidFill>
                   <a:srgbClr val="7030A0"/>
                 </a:solidFill>
@@ -4475,13 +4382,6 @@
   <p:clrMapOvr>
     <a:masterClrMapping/>
   </p:clrMapOvr>
-  <p:timing>
-    <p:tnLst>
-      <p:par>
-        <p:cTn id="1" dur="indefinite" restart="never" nodeType="tmRoot"/>
-      </p:par>
-    </p:tnLst>
-  </p:timing>
 </p:sld>
 </file>
 
@@ -4537,7 +4437,7 @@
           <a:lstStyle/>
           <a:p>
             <a:r>
-              <a:rPr lang="en-GB" dirty="0" smtClean="0">
+              <a:rPr lang="en-GB" dirty="0">
                 <a:solidFill>
                   <a:schemeClr val="accent2">
                     <a:lumMod val="50000"/>
@@ -4546,13 +4446,6 @@
               </a:rPr>
               <a:t>Server</a:t>
             </a:r>
-            <a:endParaRPr lang="en-GB" dirty="0">
-              <a:solidFill>
-                <a:schemeClr val="accent2">
-                  <a:lumMod val="50000"/>
-                </a:schemeClr>
-              </a:solidFill>
-            </a:endParaRPr>
           </a:p>
         </p:txBody>
       </p:sp>
@@ -4606,7 +4499,7 @@
           <a:p>
             <a:pPr algn="ctr"/>
             <a:r>
-              <a:rPr lang="en-GB" dirty="0" err="1" smtClean="0">
+              <a:rPr lang="en-GB" dirty="0" err="1">
                 <a:solidFill>
                   <a:schemeClr val="accent6">
                     <a:lumMod val="50000"/>
@@ -4656,18 +4549,13 @@
           <a:p>
             <a:pPr algn="ctr"/>
             <a:r>
-              <a:rPr lang="en-GB" dirty="0" smtClean="0">
+              <a:rPr lang="en-GB" dirty="0">
                 <a:solidFill>
                   <a:schemeClr val="bg1"/>
                 </a:solidFill>
               </a:rPr>
               <a:t>Client</a:t>
             </a:r>
-            <a:endParaRPr lang="en-GB" dirty="0">
-              <a:solidFill>
-                <a:schemeClr val="bg1"/>
-              </a:solidFill>
-            </a:endParaRPr>
           </a:p>
         </p:txBody>
       </p:sp>
@@ -4719,7 +4607,7 @@
           <a:p>
             <a:pPr algn="ctr"/>
             <a:r>
-              <a:rPr lang="en-GB" sz="1400" dirty="0" err="1" smtClean="0">
+              <a:rPr lang="en-GB" sz="1400" dirty="0" err="1">
                 <a:solidFill>
                   <a:schemeClr val="accent2">
                     <a:lumMod val="50000"/>
@@ -4729,7 +4617,7 @@
               <a:t>Websocket</a:t>
             </a:r>
             <a:r>
-              <a:rPr lang="en-GB" sz="1400" dirty="0" smtClean="0">
+              <a:rPr lang="en-GB" sz="1400" dirty="0">
                 <a:solidFill>
                   <a:schemeClr val="accent2">
                     <a:lumMod val="50000"/>
@@ -4742,7 +4630,7 @@
           <a:p>
             <a:pPr algn="ctr"/>
             <a:r>
-              <a:rPr lang="en-GB" sz="1400" dirty="0" smtClean="0">
+              <a:rPr lang="en-GB" sz="1400" dirty="0">
                 <a:solidFill>
                   <a:schemeClr val="accent2">
                     <a:lumMod val="50000"/>
@@ -4751,13 +4639,6 @@
               </a:rPr>
               <a:t>handler</a:t>
             </a:r>
-            <a:endParaRPr lang="en-GB" sz="1400" dirty="0">
-              <a:solidFill>
-                <a:schemeClr val="accent2">
-                  <a:lumMod val="50000"/>
-                </a:schemeClr>
-              </a:solidFill>
-            </a:endParaRPr>
           </a:p>
         </p:txBody>
       </p:sp>
@@ -4809,7 +4690,7 @@
           <a:p>
             <a:pPr algn="ctr"/>
             <a:r>
-              <a:rPr lang="en-GB" sz="1400" dirty="0" smtClean="0">
+              <a:rPr lang="en-GB" sz="1400" dirty="0">
                 <a:solidFill>
                   <a:schemeClr val="accent2">
                     <a:lumMod val="50000"/>
@@ -4818,13 +4699,6 @@
               </a:rPr>
               <a:t>Feature1</a:t>
             </a:r>
-            <a:endParaRPr lang="en-GB" sz="1400" dirty="0">
-              <a:solidFill>
-                <a:schemeClr val="accent2">
-                  <a:lumMod val="50000"/>
-                </a:schemeClr>
-              </a:solidFill>
-            </a:endParaRPr>
           </a:p>
         </p:txBody>
       </p:sp>
@@ -4876,7 +4750,7 @@
           <a:p>
             <a:pPr algn="ctr"/>
             <a:r>
-              <a:rPr lang="en-GB" sz="1400" dirty="0" smtClean="0">
+              <a:rPr lang="en-GB" sz="1400" dirty="0">
                 <a:solidFill>
                   <a:schemeClr val="accent2">
                     <a:lumMod val="50000"/>
@@ -4885,13 +4759,6 @@
               </a:rPr>
               <a:t>Feature2</a:t>
             </a:r>
-            <a:endParaRPr lang="en-GB" sz="1400" dirty="0">
-              <a:solidFill>
-                <a:schemeClr val="accent2">
-                  <a:lumMod val="50000"/>
-                </a:schemeClr>
-              </a:solidFill>
-            </a:endParaRPr>
           </a:p>
         </p:txBody>
       </p:sp>
@@ -4943,7 +4810,7 @@
           <a:p>
             <a:pPr algn="ctr"/>
             <a:r>
-              <a:rPr lang="en-GB" sz="1400" dirty="0" err="1" smtClean="0">
+              <a:rPr lang="en-GB" sz="1400" dirty="0" err="1">
                 <a:solidFill>
                   <a:srgbClr val="7030A0"/>
                 </a:solidFill>
@@ -4951,18 +4818,13 @@
               <a:t>Auth</a:t>
             </a:r>
             <a:r>
-              <a:rPr lang="en-GB" sz="1400" dirty="0" smtClean="0">
+              <a:rPr lang="en-GB" sz="1400" dirty="0">
                 <a:solidFill>
                   <a:srgbClr val="7030A0"/>
                 </a:solidFill>
               </a:rPr>
               <a:t> Feature</a:t>
             </a:r>
-            <a:endParaRPr lang="en-GB" sz="1400" dirty="0">
-              <a:solidFill>
-                <a:srgbClr val="7030A0"/>
-              </a:solidFill>
-            </a:endParaRPr>
           </a:p>
         </p:txBody>
       </p:sp>
@@ -5158,7 +5020,7 @@
           <a:lstStyle/>
           <a:p>
             <a:r>
-              <a:rPr lang="en-GB" sz="1600" dirty="0" err="1" smtClean="0">
+              <a:rPr lang="en-GB" sz="1600" dirty="0" err="1">
                 <a:solidFill>
                   <a:srgbClr val="7030A0"/>
                 </a:solidFill>
@@ -5166,7 +5028,7 @@
               <a:t>Websocket</a:t>
             </a:r>
             <a:r>
-              <a:rPr lang="en-GB" sz="1600" dirty="0" smtClean="0">
+              <a:rPr lang="en-GB" sz="1600" dirty="0">
                 <a:solidFill>
                   <a:srgbClr val="7030A0"/>
                 </a:solidFill>
@@ -5174,7 +5036,7 @@
               <a:t> </a:t>
             </a:r>
             <a:r>
-              <a:rPr lang="en-GB" sz="1600" dirty="0" err="1" smtClean="0">
+              <a:rPr lang="en-GB" sz="1600" dirty="0" err="1">
                 <a:solidFill>
                   <a:srgbClr val="7030A0"/>
                 </a:solidFill>
@@ -5182,7 +5044,7 @@
               <a:t>auth</a:t>
             </a:r>
             <a:r>
-              <a:rPr lang="en-GB" sz="1600" dirty="0" smtClean="0">
+              <a:rPr lang="en-GB" sz="1600" dirty="0">
                 <a:solidFill>
                   <a:srgbClr val="7030A0"/>
                 </a:solidFill>
@@ -5190,7 +5052,7 @@
               <a:t> state</a:t>
             </a:r>
             <a:r>
-              <a:rPr lang="en-GB" sz="1600" smtClean="0">
+              <a:rPr lang="en-GB" sz="1600">
                 <a:solidFill>
                   <a:srgbClr val="7030A0"/>
                 </a:solidFill>
@@ -5198,7 +5060,7 @@
               <a:t>: exactly one </a:t>
             </a:r>
             <a:r>
-              <a:rPr lang="en-GB" sz="1600" dirty="0" smtClean="0">
+              <a:rPr lang="en-GB" sz="1600" dirty="0">
                 <a:solidFill>
                   <a:srgbClr val="7030A0"/>
                 </a:solidFill>
@@ -5212,7 +5074,7 @@
               <a:buChar char="•"/>
             </a:pPr>
             <a:r>
-              <a:rPr lang="en-GB" sz="1600" i="1" dirty="0" smtClean="0">
+              <a:rPr lang="en-GB" sz="1600" i="1" dirty="0">
                 <a:solidFill>
                   <a:srgbClr val="7030A0"/>
                 </a:solidFill>
@@ -5220,7 +5082,7 @@
               <a:t>authorized</a:t>
             </a:r>
             <a:r>
-              <a:rPr lang="en-GB" sz="1600" dirty="0" smtClean="0">
+              <a:rPr lang="en-GB" sz="1600" dirty="0">
                 <a:solidFill>
                   <a:srgbClr val="7030A0"/>
                 </a:solidFill>
@@ -5228,7 +5090,7 @@
               <a:t> (with </a:t>
             </a:r>
             <a:r>
-              <a:rPr lang="en-GB" sz="1600" dirty="0" err="1" smtClean="0">
+              <a:rPr lang="en-GB" sz="1600" dirty="0" err="1">
                 <a:solidFill>
                   <a:srgbClr val="7030A0"/>
                 </a:solidFill>
@@ -5236,7 +5098,7 @@
               <a:t>userid</a:t>
             </a:r>
             <a:r>
-              <a:rPr lang="en-GB" sz="1600" dirty="0" smtClean="0">
+              <a:rPr lang="en-GB" sz="1600" dirty="0">
                 <a:solidFill>
                   <a:srgbClr val="7030A0"/>
                 </a:solidFill>
@@ -5250,7 +5112,7 @@
               <a:buChar char="•"/>
             </a:pPr>
             <a:r>
-              <a:rPr lang="en-GB" sz="1600" i="1" dirty="0" smtClean="0">
+              <a:rPr lang="en-GB" sz="1600" i="1" dirty="0">
                 <a:solidFill>
                   <a:srgbClr val="7030A0"/>
                 </a:solidFill>
@@ -5258,14 +5120,14 @@
               <a:t>not-authorized</a:t>
             </a:r>
             <a:r>
-              <a:rPr lang="en-GB" sz="1600" dirty="0" smtClean="0">
+              <a:rPr lang="en-GB" sz="1600" dirty="0">
                 <a:solidFill>
                   <a:srgbClr val="7030A0"/>
                 </a:solidFill>
               </a:rPr>
               <a:t> (with request whitelist)</a:t>
             </a:r>
-            <a:endParaRPr lang="en-GB" sz="1100" dirty="0" smtClean="0">
+            <a:endParaRPr lang="en-GB" sz="1100" dirty="0">
               <a:solidFill>
                 <a:srgbClr val="7030A0"/>
               </a:solidFill>
@@ -5283,13 +5145,6 @@
   <p:clrMapOvr>
     <a:masterClrMapping/>
   </p:clrMapOvr>
-  <p:timing>
-    <p:tnLst>
-      <p:par>
-        <p:cTn id="1" dur="indefinite" restart="never" nodeType="tmRoot"/>
-      </p:par>
-    </p:tnLst>
-  </p:timing>
 </p:sld>
 </file>
 
@@ -5345,7 +5200,7 @@
           <a:lstStyle/>
           <a:p>
             <a:r>
-              <a:rPr lang="en-GB" dirty="0" smtClean="0">
+              <a:rPr lang="en-GB" dirty="0">
                 <a:solidFill>
                   <a:schemeClr val="accent2">
                     <a:lumMod val="50000"/>
@@ -5354,13 +5209,6 @@
               </a:rPr>
               <a:t>Server</a:t>
             </a:r>
-            <a:endParaRPr lang="en-GB" dirty="0">
-              <a:solidFill>
-                <a:schemeClr val="accent2">
-                  <a:lumMod val="50000"/>
-                </a:schemeClr>
-              </a:solidFill>
-            </a:endParaRPr>
           </a:p>
         </p:txBody>
       </p:sp>
@@ -5414,7 +5262,7 @@
           <a:p>
             <a:pPr algn="ctr"/>
             <a:r>
-              <a:rPr lang="en-GB" dirty="0" err="1" smtClean="0">
+              <a:rPr lang="en-GB" dirty="0" err="1">
                 <a:solidFill>
                   <a:schemeClr val="accent6">
                     <a:lumMod val="50000"/>
@@ -5464,18 +5312,13 @@
           <a:p>
             <a:pPr algn="ctr"/>
             <a:r>
-              <a:rPr lang="en-GB" dirty="0" smtClean="0">
+              <a:rPr lang="en-GB" dirty="0">
                 <a:solidFill>
                   <a:schemeClr val="bg1"/>
                 </a:solidFill>
               </a:rPr>
               <a:t>Client</a:t>
             </a:r>
-            <a:endParaRPr lang="en-GB" dirty="0">
-              <a:solidFill>
-                <a:schemeClr val="bg1"/>
-              </a:solidFill>
-            </a:endParaRPr>
           </a:p>
         </p:txBody>
       </p:sp>
@@ -5527,7 +5370,7 @@
           <a:p>
             <a:pPr algn="ctr"/>
             <a:r>
-              <a:rPr lang="en-GB" sz="1400" dirty="0" err="1" smtClean="0">
+              <a:rPr lang="en-GB" sz="1400" dirty="0" err="1">
                 <a:solidFill>
                   <a:schemeClr val="accent2">
                     <a:lumMod val="50000"/>
@@ -5537,7 +5380,7 @@
               <a:t>Websocket</a:t>
             </a:r>
             <a:r>
-              <a:rPr lang="en-GB" sz="1400" dirty="0" smtClean="0">
+              <a:rPr lang="en-GB" sz="1400" dirty="0">
                 <a:solidFill>
                   <a:schemeClr val="accent2">
                     <a:lumMod val="50000"/>
@@ -5550,7 +5393,7 @@
           <a:p>
             <a:pPr algn="ctr"/>
             <a:r>
-              <a:rPr lang="en-GB" sz="1400" dirty="0" smtClean="0">
+              <a:rPr lang="en-GB" sz="1400" dirty="0">
                 <a:solidFill>
                   <a:schemeClr val="accent2">
                     <a:lumMod val="50000"/>
@@ -5559,13 +5402,6 @@
               </a:rPr>
               <a:t>handler</a:t>
             </a:r>
-            <a:endParaRPr lang="en-GB" sz="1400" dirty="0">
-              <a:solidFill>
-                <a:schemeClr val="accent2">
-                  <a:lumMod val="50000"/>
-                </a:schemeClr>
-              </a:solidFill>
-            </a:endParaRPr>
           </a:p>
         </p:txBody>
       </p:sp>
@@ -5617,7 +5453,7 @@
           <a:p>
             <a:pPr algn="ctr"/>
             <a:r>
-              <a:rPr lang="en-GB" sz="1400" dirty="0" smtClean="0">
+              <a:rPr lang="en-GB" sz="1400" dirty="0">
                 <a:solidFill>
                   <a:schemeClr val="accent2">
                     <a:lumMod val="50000"/>
@@ -5626,13 +5462,6 @@
               </a:rPr>
               <a:t>Feature1</a:t>
             </a:r>
-            <a:endParaRPr lang="en-GB" sz="1400" dirty="0">
-              <a:solidFill>
-                <a:schemeClr val="accent2">
-                  <a:lumMod val="50000"/>
-                </a:schemeClr>
-              </a:solidFill>
-            </a:endParaRPr>
           </a:p>
         </p:txBody>
       </p:sp>
@@ -5684,7 +5513,7 @@
           <a:p>
             <a:pPr algn="ctr"/>
             <a:r>
-              <a:rPr lang="en-GB" sz="1400" dirty="0" smtClean="0">
+              <a:rPr lang="en-GB" sz="1400" dirty="0">
                 <a:solidFill>
                   <a:schemeClr val="accent2">
                     <a:lumMod val="50000"/>
@@ -5693,13 +5522,6 @@
               </a:rPr>
               <a:t>Feature2</a:t>
             </a:r>
-            <a:endParaRPr lang="en-GB" sz="1400" dirty="0">
-              <a:solidFill>
-                <a:schemeClr val="accent2">
-                  <a:lumMod val="50000"/>
-                </a:schemeClr>
-              </a:solidFill>
-            </a:endParaRPr>
           </a:p>
         </p:txBody>
       </p:sp>
@@ -5751,7 +5573,7 @@
           <a:p>
             <a:pPr algn="ctr"/>
             <a:r>
-              <a:rPr lang="en-GB" sz="1400" dirty="0" smtClean="0">
+              <a:rPr lang="en-GB" sz="1400" dirty="0">
                 <a:solidFill>
                   <a:schemeClr val="accent2">
                     <a:lumMod val="50000"/>
@@ -5760,13 +5582,6 @@
               </a:rPr>
               <a:t>Feature3</a:t>
             </a:r>
-            <a:endParaRPr lang="en-GB" sz="1400" dirty="0">
-              <a:solidFill>
-                <a:schemeClr val="accent2">
-                  <a:lumMod val="50000"/>
-                </a:schemeClr>
-              </a:solidFill>
-            </a:endParaRPr>
           </a:p>
         </p:txBody>
       </p:sp>
@@ -5941,7 +5756,7 @@
           <a:p>
             <a:pPr algn="ctr"/>
             <a:r>
-              <a:rPr lang="en-GB" dirty="0" err="1" smtClean="0">
+              <a:rPr lang="en-GB" dirty="0" err="1">
                 <a:solidFill>
                   <a:schemeClr val="accent6">
                     <a:lumMod val="50000"/>
@@ -6008,7 +5823,7 @@
           <a:p>
             <a:pPr algn="ctr"/>
             <a:r>
-              <a:rPr lang="en-GB" sz="1400" dirty="0" err="1" smtClean="0">
+              <a:rPr lang="en-GB" sz="1400" dirty="0" err="1">
                 <a:solidFill>
                   <a:schemeClr val="accent2">
                     <a:lumMod val="50000"/>
@@ -6018,7 +5833,7 @@
               <a:t>Websocket</a:t>
             </a:r>
             <a:r>
-              <a:rPr lang="en-GB" sz="1400" dirty="0" smtClean="0">
+              <a:rPr lang="en-GB" sz="1400" dirty="0">
                 <a:solidFill>
                   <a:schemeClr val="accent2">
                     <a:lumMod val="50000"/>
@@ -6031,7 +5846,7 @@
           <a:p>
             <a:pPr algn="ctr"/>
             <a:r>
-              <a:rPr lang="en-GB" sz="1400" dirty="0" smtClean="0">
+              <a:rPr lang="en-GB" sz="1400" dirty="0">
                 <a:solidFill>
                   <a:schemeClr val="accent2">
                     <a:lumMod val="50000"/>
@@ -6040,13 +5855,6 @@
               </a:rPr>
               <a:t>handler</a:t>
             </a:r>
-            <a:endParaRPr lang="en-GB" sz="1400" dirty="0">
-              <a:solidFill>
-                <a:schemeClr val="accent2">
-                  <a:lumMod val="50000"/>
-                </a:schemeClr>
-              </a:solidFill>
-            </a:endParaRPr>
           </a:p>
         </p:txBody>
       </p:sp>
@@ -6098,7 +5906,7 @@
           <a:p>
             <a:pPr algn="ctr"/>
             <a:r>
-              <a:rPr lang="en-GB" sz="1400" dirty="0" smtClean="0">
+              <a:rPr lang="en-GB" sz="1400" dirty="0">
                 <a:solidFill>
                   <a:schemeClr val="accent2">
                     <a:lumMod val="50000"/>
@@ -6107,13 +5915,6 @@
               </a:rPr>
               <a:t>Feature1</a:t>
             </a:r>
-            <a:endParaRPr lang="en-GB" sz="1400" dirty="0">
-              <a:solidFill>
-                <a:schemeClr val="accent2">
-                  <a:lumMod val="50000"/>
-                </a:schemeClr>
-              </a:solidFill>
-            </a:endParaRPr>
           </a:p>
         </p:txBody>
       </p:sp>
@@ -6165,7 +5966,7 @@
           <a:p>
             <a:pPr algn="ctr"/>
             <a:r>
-              <a:rPr lang="en-GB" sz="1400" dirty="0" smtClean="0">
+              <a:rPr lang="en-GB" sz="1400" dirty="0">
                 <a:solidFill>
                   <a:schemeClr val="accent2">
                     <a:lumMod val="50000"/>
@@ -6174,13 +5975,6 @@
               </a:rPr>
               <a:t>Feature3</a:t>
             </a:r>
-            <a:endParaRPr lang="en-GB" sz="1400" dirty="0">
-              <a:solidFill>
-                <a:schemeClr val="accent2">
-                  <a:lumMod val="50000"/>
-                </a:schemeClr>
-              </a:solidFill>
-            </a:endParaRPr>
           </a:p>
         </p:txBody>
       </p:sp>
@@ -6232,7 +6026,7 @@
           <a:p>
             <a:pPr algn="ctr"/>
             <a:r>
-              <a:rPr lang="en-GB" sz="1400" dirty="0" smtClean="0">
+              <a:rPr lang="en-GB" sz="1400" dirty="0">
                 <a:solidFill>
                   <a:schemeClr val="accent2">
                     <a:lumMod val="50000"/>
@@ -6241,13 +6035,6 @@
               </a:rPr>
               <a:t>Feature4</a:t>
             </a:r>
-            <a:endParaRPr lang="en-GB" sz="1400" dirty="0">
-              <a:solidFill>
-                <a:schemeClr val="accent2">
-                  <a:lumMod val="50000"/>
-                </a:schemeClr>
-              </a:solidFill>
-            </a:endParaRPr>
           </a:p>
         </p:txBody>
       </p:sp>
@@ -6403,18 +6190,13 @@
           <a:p>
             <a:pPr algn="ctr"/>
             <a:r>
-              <a:rPr lang="en-GB" dirty="0" smtClean="0">
+              <a:rPr lang="en-GB" dirty="0">
                 <a:solidFill>
                   <a:schemeClr val="bg1"/>
                 </a:solidFill>
               </a:rPr>
               <a:t>Client</a:t>
             </a:r>
-            <a:endParaRPr lang="en-GB" dirty="0">
-              <a:solidFill>
-                <a:schemeClr val="bg1"/>
-              </a:solidFill>
-            </a:endParaRPr>
           </a:p>
         </p:txBody>
       </p:sp>
@@ -6428,13 +6210,6 @@
   <p:clrMapOvr>
     <a:masterClrMapping/>
   </p:clrMapOvr>
-  <p:timing>
-    <p:tnLst>
-      <p:par>
-        <p:cTn id="1" dur="indefinite" restart="never" nodeType="tmRoot"/>
-      </p:par>
-    </p:tnLst>
-  </p:timing>
 </p:sld>
 </file>
 
@@ -6491,7 +6266,7 @@
           <a:p>
             <a:pPr algn="r"/>
             <a:r>
-              <a:rPr lang="en-GB" dirty="0" smtClean="0">
+              <a:rPr lang="en-GB" dirty="0">
                 <a:solidFill>
                   <a:schemeClr val="accent1">
                     <a:lumMod val="50000"/>
@@ -6500,13 +6275,6 @@
               </a:rPr>
               <a:t>Client</a:t>
             </a:r>
-            <a:endParaRPr lang="en-GB" dirty="0">
-              <a:solidFill>
-                <a:schemeClr val="accent1">
-                  <a:lumMod val="50000"/>
-                </a:schemeClr>
-              </a:solidFill>
-            </a:endParaRPr>
           </a:p>
         </p:txBody>
       </p:sp>
@@ -6545,7 +6313,7 @@
           <a:lstStyle/>
           <a:p>
             <a:r>
-              <a:rPr lang="en-GB" dirty="0" smtClean="0">
+              <a:rPr lang="en-GB" dirty="0">
                 <a:solidFill>
                   <a:schemeClr val="accent2">
                     <a:lumMod val="50000"/>
@@ -6554,13 +6322,6 @@
               </a:rPr>
               <a:t>Server</a:t>
             </a:r>
-            <a:endParaRPr lang="en-GB" dirty="0">
-              <a:solidFill>
-                <a:schemeClr val="accent2">
-                  <a:lumMod val="50000"/>
-                </a:schemeClr>
-              </a:solidFill>
-            </a:endParaRPr>
           </a:p>
         </p:txBody>
       </p:sp>
@@ -6614,7 +6375,7 @@
           <a:p>
             <a:pPr algn="ctr"/>
             <a:r>
-              <a:rPr lang="en-GB" dirty="0" err="1" smtClean="0">
+              <a:rPr lang="en-GB" dirty="0" err="1">
                 <a:solidFill>
                   <a:schemeClr val="accent6">
                     <a:lumMod val="50000"/>
@@ -6681,7 +6442,7 @@
           <a:p>
             <a:pPr algn="ctr"/>
             <a:r>
-              <a:rPr lang="en-GB" sz="1400" dirty="0" err="1" smtClean="0">
+              <a:rPr lang="en-GB" sz="1400" dirty="0" err="1">
                 <a:solidFill>
                   <a:schemeClr val="accent2">
                     <a:lumMod val="50000"/>
@@ -6691,7 +6452,7 @@
               <a:t>Websocket</a:t>
             </a:r>
             <a:r>
-              <a:rPr lang="en-GB" sz="1400" dirty="0" smtClean="0">
+              <a:rPr lang="en-GB" sz="1400" dirty="0">
                 <a:solidFill>
                   <a:schemeClr val="accent2">
                     <a:lumMod val="50000"/>
@@ -6704,7 +6465,7 @@
           <a:p>
             <a:pPr algn="ctr"/>
             <a:r>
-              <a:rPr lang="en-GB" sz="1400" dirty="0" smtClean="0">
+              <a:rPr lang="en-GB" sz="1400" dirty="0">
                 <a:solidFill>
                   <a:schemeClr val="accent2">
                     <a:lumMod val="50000"/>
@@ -6713,13 +6474,6 @@
               </a:rPr>
               <a:t>handler</a:t>
             </a:r>
-            <a:endParaRPr lang="en-GB" sz="1400" dirty="0">
-              <a:solidFill>
-                <a:schemeClr val="accent2">
-                  <a:lumMod val="50000"/>
-                </a:schemeClr>
-              </a:solidFill>
-            </a:endParaRPr>
           </a:p>
         </p:txBody>
       </p:sp>
@@ -6771,7 +6525,7 @@
           <a:p>
             <a:pPr algn="ctr"/>
             <a:r>
-              <a:rPr lang="en-GB" sz="1400" dirty="0" smtClean="0">
+              <a:rPr lang="en-GB" sz="1400" dirty="0">
                 <a:solidFill>
                   <a:schemeClr val="accent2">
                     <a:lumMod val="50000"/>
@@ -6780,13 +6534,6 @@
               </a:rPr>
               <a:t>Feature1</a:t>
             </a:r>
-            <a:endParaRPr lang="en-GB" sz="1400" dirty="0">
-              <a:solidFill>
-                <a:schemeClr val="accent2">
-                  <a:lumMod val="50000"/>
-                </a:schemeClr>
-              </a:solidFill>
-            </a:endParaRPr>
           </a:p>
         </p:txBody>
       </p:sp>
@@ -6838,7 +6585,7 @@
           <a:p>
             <a:pPr algn="ctr"/>
             <a:r>
-              <a:rPr lang="en-GB" sz="1400" dirty="0" smtClean="0">
+              <a:rPr lang="en-GB" sz="1400" dirty="0">
                 <a:solidFill>
                   <a:schemeClr val="accent2">
                     <a:lumMod val="50000"/>
@@ -6847,13 +6594,6 @@
               </a:rPr>
               <a:t>Feature2</a:t>
             </a:r>
-            <a:endParaRPr lang="en-GB" sz="1400" dirty="0">
-              <a:solidFill>
-                <a:schemeClr val="accent2">
-                  <a:lumMod val="50000"/>
-                </a:schemeClr>
-              </a:solidFill>
-            </a:endParaRPr>
           </a:p>
         </p:txBody>
       </p:sp>
@@ -6905,7 +6645,7 @@
           <a:p>
             <a:pPr algn="ctr"/>
             <a:r>
-              <a:rPr lang="en-GB" sz="1400" dirty="0" smtClean="0">
+              <a:rPr lang="en-GB" sz="1400" dirty="0">
                 <a:solidFill>
                   <a:schemeClr val="accent2">
                     <a:lumMod val="50000"/>
@@ -6914,13 +6654,6 @@
               </a:rPr>
               <a:t>Feature3</a:t>
             </a:r>
-            <a:endParaRPr lang="en-GB" sz="1400" dirty="0">
-              <a:solidFill>
-                <a:schemeClr val="accent2">
-                  <a:lumMod val="50000"/>
-                </a:schemeClr>
-              </a:solidFill>
-            </a:endParaRPr>
           </a:p>
         </p:txBody>
       </p:sp>
@@ -7145,7 +6878,7 @@
           <a:p>
             <a:pPr algn="ctr"/>
             <a:r>
-              <a:rPr lang="en-GB" sz="1400" dirty="0" err="1" smtClean="0">
+              <a:rPr lang="en-GB" sz="1400" dirty="0" err="1">
                 <a:solidFill>
                   <a:schemeClr val="accent1">
                     <a:lumMod val="75000"/>
@@ -7155,7 +6888,7 @@
               <a:t>Websocket</a:t>
             </a:r>
             <a:r>
-              <a:rPr lang="en-GB" sz="1400" dirty="0" smtClean="0">
+              <a:rPr lang="en-GB" sz="1400" dirty="0">
                 <a:solidFill>
                   <a:schemeClr val="accent1">
                     <a:lumMod val="75000"/>
@@ -7168,7 +6901,7 @@
           <a:p>
             <a:pPr algn="ctr"/>
             <a:r>
-              <a:rPr lang="en-GB" sz="1400" dirty="0" smtClean="0">
+              <a:rPr lang="en-GB" sz="1400" dirty="0">
                 <a:solidFill>
                   <a:schemeClr val="accent1">
                     <a:lumMod val="75000"/>
@@ -7177,13 +6910,6 @@
               </a:rPr>
               <a:t>handler</a:t>
             </a:r>
-            <a:endParaRPr lang="en-GB" sz="1400" dirty="0">
-              <a:solidFill>
-                <a:schemeClr val="accent1">
-                  <a:lumMod val="75000"/>
-                </a:schemeClr>
-              </a:solidFill>
-            </a:endParaRPr>
           </a:p>
         </p:txBody>
       </p:sp>
@@ -7237,22 +6963,15 @@
           <a:p>
             <a:pPr algn="ctr"/>
             <a:r>
-              <a:rPr lang="en-GB" sz="1400" dirty="0" smtClean="0">
+              <a:rPr lang="en-GB" sz="1400" dirty="0">
                 <a:solidFill>
                   <a:schemeClr val="accent1">
                     <a:lumMod val="75000"/>
                   </a:schemeClr>
                 </a:solidFill>
               </a:rPr>
-              <a:t>Endpoint2</a:t>
-            </a:r>
-            <a:endParaRPr lang="en-GB" sz="1400" dirty="0">
-              <a:solidFill>
-                <a:schemeClr val="accent1">
-                  <a:lumMod val="75000"/>
-                </a:schemeClr>
-              </a:solidFill>
-            </a:endParaRPr>
+              <a:t>Channel2</a:t>
+            </a:r>
           </a:p>
         </p:txBody>
       </p:sp>
@@ -7306,22 +7025,15 @@
           <a:p>
             <a:pPr algn="ctr"/>
             <a:r>
-              <a:rPr lang="en-GB" sz="1400" dirty="0" smtClean="0">
+              <a:rPr lang="en-GB" sz="1400" dirty="0">
                 <a:solidFill>
                   <a:schemeClr val="accent1">
                     <a:lumMod val="75000"/>
                   </a:schemeClr>
                 </a:solidFill>
               </a:rPr>
-              <a:t>Endpoint1</a:t>
-            </a:r>
-            <a:endParaRPr lang="en-GB" sz="1400" dirty="0">
-              <a:solidFill>
-                <a:schemeClr val="accent1">
-                  <a:lumMod val="75000"/>
-                </a:schemeClr>
-              </a:solidFill>
-            </a:endParaRPr>
+              <a:t>Channel1</a:t>
+            </a:r>
           </a:p>
         </p:txBody>
       </p:sp>
@@ -7375,22 +7087,15 @@
           <a:p>
             <a:pPr algn="ctr"/>
             <a:r>
-              <a:rPr lang="en-GB" sz="1400" dirty="0" smtClean="0">
+              <a:rPr lang="en-GB" sz="1400" dirty="0">
                 <a:solidFill>
                   <a:schemeClr val="accent1">
                     <a:lumMod val="75000"/>
                   </a:schemeClr>
                 </a:solidFill>
               </a:rPr>
-              <a:t>Endpoint3</a:t>
-            </a:r>
-            <a:endParaRPr lang="en-GB" sz="1400" dirty="0">
-              <a:solidFill>
-                <a:schemeClr val="accent1">
-                  <a:lumMod val="75000"/>
-                </a:schemeClr>
-              </a:solidFill>
-            </a:endParaRPr>
+              <a:t>Channel3</a:t>
+            </a:r>
           </a:p>
         </p:txBody>
       </p:sp>
@@ -7537,7 +7242,7 @@
           <a:lstStyle/>
           <a:p>
             <a:r>
-              <a:rPr lang="en-GB" sz="1600" dirty="0" smtClean="0">
+              <a:rPr lang="en-GB" sz="1600" dirty="0">
                 <a:solidFill>
                   <a:srgbClr val="7030A0"/>
                 </a:solidFill>
@@ -7545,7 +7250,7 @@
               <a:t>Notification </a:t>
             </a:r>
             <a:r>
-              <a:rPr lang="en-GB" sz="1600" dirty="0" err="1" smtClean="0">
+              <a:rPr lang="en-GB" sz="1600" dirty="0" err="1">
                 <a:solidFill>
                   <a:srgbClr val="7030A0"/>
                 </a:solidFill>
@@ -7553,7 +7258,7 @@
               <a:t>demux</a:t>
             </a:r>
             <a:r>
-              <a:rPr lang="en-GB" sz="1600" dirty="0" smtClean="0">
+              <a:rPr lang="en-GB" sz="1600" dirty="0">
                 <a:solidFill>
                   <a:srgbClr val="7030A0"/>
                 </a:solidFill>
@@ -7563,7 +7268,7 @@
           </a:p>
           <a:p>
             <a:r>
-              <a:rPr lang="en-GB" sz="1600" dirty="0" smtClean="0">
+              <a:rPr lang="en-GB" sz="1600" dirty="0">
                 <a:solidFill>
                   <a:srgbClr val="7030A0"/>
                 </a:solidFill>
@@ -7571,17 +7276,17 @@
               <a:t>off </a:t>
             </a:r>
             <a:r>
-              <a:rPr lang="en-GB" sz="1600" dirty="0" smtClean="0">
+              <a:rPr lang="en-GB" sz="1600" dirty="0">
                 <a:solidFill>
                   <a:srgbClr val="7030A0"/>
                 </a:solidFill>
                 <a:latin typeface="Franklin Gothic Medium Cond" panose="020B0606030402020204" pitchFamily="34" charset="0"/>
                 <a:cs typeface="Courier New" panose="02070309020205020404" pitchFamily="49" charset="0"/>
               </a:rPr>
-              <a:t>endpoint</a:t>
-            </a:r>
-            <a:r>
-              <a:rPr lang="en-GB" sz="1600" dirty="0" smtClean="0">
+              <a:t>channel</a:t>
+            </a:r>
+            <a:r>
+              <a:rPr lang="en-GB" sz="1600" dirty="0">
                 <a:solidFill>
                   <a:srgbClr val="7030A0"/>
                 </a:solidFill>
@@ -7589,12 +7294,6 @@
               </a:rPr>
               <a:t> value</a:t>
             </a:r>
-            <a:endParaRPr lang="en-GB" sz="1600" dirty="0">
-              <a:solidFill>
-                <a:srgbClr val="7030A0"/>
-              </a:solidFill>
-              <a:cs typeface="Courier New" panose="02070309020205020404" pitchFamily="49" charset="0"/>
-            </a:endParaRPr>
           </a:p>
         </p:txBody>
       </p:sp>
@@ -7671,7 +7370,7 @@
           <a:lstStyle/>
           <a:p>
             <a:r>
-              <a:rPr lang="en-GB" sz="1600" dirty="0" smtClean="0">
+              <a:rPr lang="en-GB" sz="1600" dirty="0">
                 <a:solidFill>
                   <a:srgbClr val="7030A0"/>
                 </a:solidFill>
@@ -7679,7 +7378,7 @@
               <a:t>Request </a:t>
             </a:r>
             <a:r>
-              <a:rPr lang="en-GB" sz="1600" dirty="0" err="1" smtClean="0">
+              <a:rPr lang="en-GB" sz="1600" dirty="0" err="1">
                 <a:solidFill>
                   <a:srgbClr val="7030A0"/>
                 </a:solidFill>
@@ -7687,7 +7386,7 @@
               <a:t>demux</a:t>
             </a:r>
             <a:r>
-              <a:rPr lang="en-GB" sz="1600" dirty="0" smtClean="0">
+              <a:rPr lang="en-GB" sz="1600" dirty="0">
                 <a:solidFill>
                   <a:srgbClr val="7030A0"/>
                 </a:solidFill>
@@ -7697,7 +7396,7 @@
           </a:p>
           <a:p>
             <a:r>
-              <a:rPr lang="en-GB" sz="1600" dirty="0" smtClean="0">
+              <a:rPr lang="en-GB" sz="1600" dirty="0">
                 <a:solidFill>
                   <a:srgbClr val="7030A0"/>
                 </a:solidFill>
@@ -7705,7 +7404,7 @@
               <a:t>off </a:t>
             </a:r>
             <a:r>
-              <a:rPr lang="en-GB" sz="1600" dirty="0" err="1" smtClean="0">
+              <a:rPr lang="en-GB" sz="1600" dirty="0" err="1">
                 <a:solidFill>
                   <a:srgbClr val="7030A0"/>
                 </a:solidFill>
@@ -7715,7 +7414,7 @@
               <a:t>req_type</a:t>
             </a:r>
             <a:r>
-              <a:rPr lang="en-GB" sz="1600" dirty="0" smtClean="0">
+              <a:rPr lang="en-GB" sz="1600" dirty="0">
                 <a:solidFill>
                   <a:srgbClr val="7030A0"/>
                 </a:solidFill>
@@ -7725,7 +7424,7 @@
           </a:p>
           <a:p>
             <a:r>
-              <a:rPr lang="en-GB" sz="1100" dirty="0" smtClean="0">
+              <a:rPr lang="en-GB" sz="1100" dirty="0">
                 <a:solidFill>
                   <a:srgbClr val="7030A0"/>
                 </a:solidFill>
@@ -8027,13 +7726,6 @@
   <p:clrMapOvr>
     <a:masterClrMapping/>
   </p:clrMapOvr>
-  <p:timing>
-    <p:tnLst>
-      <p:par>
-        <p:cTn id="1" dur="indefinite" restart="never" nodeType="tmRoot"/>
-      </p:par>
-    </p:tnLst>
-  </p:timing>
 </p:sld>
 </file>
 
@@ -8090,7 +7782,7 @@
           <a:p>
             <a:pPr algn="r"/>
             <a:r>
-              <a:rPr lang="en-GB" dirty="0" smtClean="0">
+              <a:rPr lang="en-GB" dirty="0">
                 <a:solidFill>
                   <a:schemeClr val="accent1">
                     <a:lumMod val="50000"/>
@@ -8099,13 +7791,6 @@
               </a:rPr>
               <a:t>Client</a:t>
             </a:r>
-            <a:endParaRPr lang="en-GB" dirty="0">
-              <a:solidFill>
-                <a:schemeClr val="accent1">
-                  <a:lumMod val="50000"/>
-                </a:schemeClr>
-              </a:solidFill>
-            </a:endParaRPr>
           </a:p>
         </p:txBody>
       </p:sp>
@@ -8144,7 +7829,7 @@
           <a:lstStyle/>
           <a:p>
             <a:r>
-              <a:rPr lang="en-GB" dirty="0" smtClean="0">
+              <a:rPr lang="en-GB" dirty="0">
                 <a:solidFill>
                   <a:schemeClr val="accent2">
                     <a:lumMod val="50000"/>
@@ -8153,13 +7838,6 @@
               </a:rPr>
               <a:t>Server</a:t>
             </a:r>
-            <a:endParaRPr lang="en-GB" dirty="0">
-              <a:solidFill>
-                <a:schemeClr val="accent2">
-                  <a:lumMod val="50000"/>
-                </a:schemeClr>
-              </a:solidFill>
-            </a:endParaRPr>
           </a:p>
         </p:txBody>
       </p:sp>
@@ -8213,7 +7891,7 @@
           <a:p>
             <a:pPr algn="ctr"/>
             <a:r>
-              <a:rPr lang="en-GB" dirty="0" err="1" smtClean="0">
+              <a:rPr lang="en-GB" dirty="0" err="1">
                 <a:solidFill>
                   <a:schemeClr val="accent6">
                     <a:lumMod val="50000"/>
@@ -8280,7 +7958,7 @@
           <a:p>
             <a:pPr algn="ctr"/>
             <a:r>
-              <a:rPr lang="en-GB" sz="1400" dirty="0" err="1" smtClean="0">
+              <a:rPr lang="en-GB" sz="1400" dirty="0" err="1">
                 <a:solidFill>
                   <a:schemeClr val="accent2">
                     <a:lumMod val="50000"/>
@@ -8290,7 +7968,7 @@
               <a:t>Websocket</a:t>
             </a:r>
             <a:r>
-              <a:rPr lang="en-GB" sz="1400" dirty="0" smtClean="0">
+              <a:rPr lang="en-GB" sz="1400" dirty="0">
                 <a:solidFill>
                   <a:schemeClr val="accent2">
                     <a:lumMod val="50000"/>
@@ -8303,7 +7981,7 @@
           <a:p>
             <a:pPr algn="ctr"/>
             <a:r>
-              <a:rPr lang="en-GB" sz="1400" dirty="0" smtClean="0">
+              <a:rPr lang="en-GB" sz="1400" dirty="0">
                 <a:solidFill>
                   <a:schemeClr val="accent2">
                     <a:lumMod val="50000"/>
@@ -8312,13 +7990,6 @@
               </a:rPr>
               <a:t>handler</a:t>
             </a:r>
-            <a:endParaRPr lang="en-GB" sz="1400" dirty="0">
-              <a:solidFill>
-                <a:schemeClr val="accent2">
-                  <a:lumMod val="50000"/>
-                </a:schemeClr>
-              </a:solidFill>
-            </a:endParaRPr>
           </a:p>
         </p:txBody>
       </p:sp>
@@ -8370,7 +8041,7 @@
           <a:p>
             <a:pPr algn="ctr"/>
             <a:r>
-              <a:rPr lang="en-GB" sz="1400" dirty="0" smtClean="0">
+              <a:rPr lang="en-GB" sz="1400" dirty="0">
                 <a:solidFill>
                   <a:schemeClr val="accent2">
                     <a:lumMod val="50000"/>
@@ -8379,13 +8050,6 @@
               </a:rPr>
               <a:t>Feature1</a:t>
             </a:r>
-            <a:endParaRPr lang="en-GB" sz="1400" dirty="0">
-              <a:solidFill>
-                <a:schemeClr val="accent2">
-                  <a:lumMod val="50000"/>
-                </a:schemeClr>
-              </a:solidFill>
-            </a:endParaRPr>
           </a:p>
         </p:txBody>
       </p:sp>
@@ -8437,7 +8101,7 @@
           <a:p>
             <a:pPr algn="ctr"/>
             <a:r>
-              <a:rPr lang="en-GB" sz="1400" dirty="0" smtClean="0">
+              <a:rPr lang="en-GB" sz="1400" dirty="0">
                 <a:solidFill>
                   <a:schemeClr val="accent2">
                     <a:lumMod val="50000"/>
@@ -8446,13 +8110,6 @@
               </a:rPr>
               <a:t>Feature2</a:t>
             </a:r>
-            <a:endParaRPr lang="en-GB" sz="1400" dirty="0">
-              <a:solidFill>
-                <a:schemeClr val="accent2">
-                  <a:lumMod val="50000"/>
-                </a:schemeClr>
-              </a:solidFill>
-            </a:endParaRPr>
           </a:p>
         </p:txBody>
       </p:sp>
@@ -8504,7 +8161,7 @@
           <a:p>
             <a:pPr algn="ctr"/>
             <a:r>
-              <a:rPr lang="en-GB" sz="1400" dirty="0" smtClean="0">
+              <a:rPr lang="en-GB" sz="1400" dirty="0">
                 <a:solidFill>
                   <a:schemeClr val="accent2">
                     <a:lumMod val="50000"/>
@@ -8513,13 +8170,6 @@
               </a:rPr>
               <a:t>Feature3</a:t>
             </a:r>
-            <a:endParaRPr lang="en-GB" sz="1400" dirty="0">
-              <a:solidFill>
-                <a:schemeClr val="accent2">
-                  <a:lumMod val="50000"/>
-                </a:schemeClr>
-              </a:solidFill>
-            </a:endParaRPr>
           </a:p>
         </p:txBody>
       </p:sp>
@@ -8744,7 +8394,7 @@
           <a:p>
             <a:pPr algn="ctr"/>
             <a:r>
-              <a:rPr lang="en-GB" sz="1400" dirty="0" err="1" smtClean="0">
+              <a:rPr lang="en-GB" sz="1400" dirty="0" err="1">
                 <a:solidFill>
                   <a:schemeClr val="accent1">
                     <a:lumMod val="75000"/>
@@ -8754,7 +8404,7 @@
               <a:t>Websocket</a:t>
             </a:r>
             <a:r>
-              <a:rPr lang="en-GB" sz="1400" dirty="0" smtClean="0">
+              <a:rPr lang="en-GB" sz="1400" dirty="0">
                 <a:solidFill>
                   <a:schemeClr val="accent1">
                     <a:lumMod val="75000"/>
@@ -8767,7 +8417,7 @@
           <a:p>
             <a:pPr algn="ctr"/>
             <a:r>
-              <a:rPr lang="en-GB" sz="1400" dirty="0" smtClean="0">
+              <a:rPr lang="en-GB" sz="1400" dirty="0">
                 <a:solidFill>
                   <a:schemeClr val="accent1">
                     <a:lumMod val="75000"/>
@@ -8776,13 +8426,6 @@
               </a:rPr>
               <a:t>handler</a:t>
             </a:r>
-            <a:endParaRPr lang="en-GB" sz="1400" dirty="0">
-              <a:solidFill>
-                <a:schemeClr val="accent1">
-                  <a:lumMod val="75000"/>
-                </a:schemeClr>
-              </a:solidFill>
-            </a:endParaRPr>
           </a:p>
         </p:txBody>
       </p:sp>
@@ -8836,22 +8479,15 @@
           <a:p>
             <a:pPr algn="ctr"/>
             <a:r>
-              <a:rPr lang="en-GB" sz="1400" dirty="0" smtClean="0">
+              <a:rPr lang="en-GB" sz="1400" dirty="0">
                 <a:solidFill>
                   <a:schemeClr val="accent1">
                     <a:lumMod val="75000"/>
                   </a:schemeClr>
                 </a:solidFill>
               </a:rPr>
-              <a:t>Endpoint2</a:t>
-            </a:r>
-            <a:endParaRPr lang="en-GB" sz="1400" dirty="0">
-              <a:solidFill>
-                <a:schemeClr val="accent1">
-                  <a:lumMod val="75000"/>
-                </a:schemeClr>
-              </a:solidFill>
-            </a:endParaRPr>
+              <a:t>Channel2</a:t>
+            </a:r>
           </a:p>
         </p:txBody>
       </p:sp>
@@ -8905,22 +8541,15 @@
           <a:p>
             <a:pPr algn="ctr"/>
             <a:r>
-              <a:rPr lang="en-GB" sz="1400" dirty="0" smtClean="0">
+              <a:rPr lang="en-GB" sz="1400" dirty="0">
                 <a:solidFill>
                   <a:schemeClr val="accent1">
                     <a:lumMod val="75000"/>
                   </a:schemeClr>
                 </a:solidFill>
               </a:rPr>
-              <a:t>Endpoint1</a:t>
-            </a:r>
-            <a:endParaRPr lang="en-GB" sz="1400" dirty="0">
-              <a:solidFill>
-                <a:schemeClr val="accent1">
-                  <a:lumMod val="75000"/>
-                </a:schemeClr>
-              </a:solidFill>
-            </a:endParaRPr>
+              <a:t>Channel1</a:t>
+            </a:r>
           </a:p>
         </p:txBody>
       </p:sp>
@@ -8974,22 +8603,15 @@
           <a:p>
             <a:pPr algn="ctr"/>
             <a:r>
-              <a:rPr lang="en-GB" sz="1400" dirty="0" smtClean="0">
+              <a:rPr lang="en-GB" sz="1400" dirty="0">
                 <a:solidFill>
                   <a:schemeClr val="accent1">
                     <a:lumMod val="75000"/>
                   </a:schemeClr>
                 </a:solidFill>
               </a:rPr>
-              <a:t>Endpoint3</a:t>
-            </a:r>
-            <a:endParaRPr lang="en-GB" sz="1400" dirty="0">
-              <a:solidFill>
-                <a:schemeClr val="accent1">
-                  <a:lumMod val="75000"/>
-                </a:schemeClr>
-              </a:solidFill>
-            </a:endParaRPr>
+              <a:t>Channel3</a:t>
+            </a:r>
           </a:p>
         </p:txBody>
       </p:sp>
@@ -9136,7 +8758,7 @@
           <a:lstStyle/>
           <a:p>
             <a:r>
-              <a:rPr lang="en-GB" sz="1600" dirty="0" smtClean="0">
+              <a:rPr lang="en-GB" sz="1600" dirty="0">
                 <a:solidFill>
                   <a:srgbClr val="7030A0"/>
                 </a:solidFill>
@@ -9144,7 +8766,7 @@
               <a:t>Notification </a:t>
             </a:r>
             <a:r>
-              <a:rPr lang="en-GB" sz="1600" dirty="0" err="1" smtClean="0">
+              <a:rPr lang="en-GB" sz="1600" dirty="0" err="1">
                 <a:solidFill>
                   <a:srgbClr val="7030A0"/>
                 </a:solidFill>
@@ -9152,7 +8774,7 @@
               <a:t>demux</a:t>
             </a:r>
             <a:r>
-              <a:rPr lang="en-GB" sz="1600" dirty="0" smtClean="0">
+              <a:rPr lang="en-GB" sz="1600" dirty="0">
                 <a:solidFill>
                   <a:srgbClr val="7030A0"/>
                 </a:solidFill>
@@ -9162,7 +8784,7 @@
           </a:p>
           <a:p>
             <a:r>
-              <a:rPr lang="en-GB" sz="1600" dirty="0" smtClean="0">
+              <a:rPr lang="en-GB" sz="1600" dirty="0">
                 <a:solidFill>
                   <a:srgbClr val="7030A0"/>
                 </a:solidFill>
@@ -9170,17 +8792,17 @@
               <a:t>off </a:t>
             </a:r>
             <a:r>
-              <a:rPr lang="en-GB" sz="1600" dirty="0" smtClean="0">
+              <a:rPr lang="en-GB" sz="1600" dirty="0">
                 <a:solidFill>
                   <a:srgbClr val="7030A0"/>
                 </a:solidFill>
                 <a:latin typeface="Franklin Gothic Medium Cond" panose="020B0606030402020204" pitchFamily="34" charset="0"/>
                 <a:cs typeface="Courier New" panose="02070309020205020404" pitchFamily="49" charset="0"/>
               </a:rPr>
-              <a:t>endpoint</a:t>
-            </a:r>
-            <a:r>
-              <a:rPr lang="en-GB" sz="1600" dirty="0" smtClean="0">
+              <a:t>channel</a:t>
+            </a:r>
+            <a:r>
+              <a:rPr lang="en-GB" sz="1600" dirty="0">
                 <a:solidFill>
                   <a:srgbClr val="7030A0"/>
                 </a:solidFill>
@@ -9190,96 +8812,67 @@
             </a:r>
           </a:p>
           <a:p>
-            <a:endParaRPr lang="en-GB" sz="1600" dirty="0" smtClean="0">
-              <a:solidFill>
-                <a:srgbClr val="7030A0"/>
-              </a:solidFill>
-            </a:endParaRPr>
-          </a:p>
-          <a:p>
-            <a:r>
-              <a:rPr lang="en-GB" sz="1600" dirty="0" smtClean="0">
-                <a:solidFill>
-                  <a:srgbClr val="7030A0"/>
-                </a:solidFill>
-              </a:rPr>
-              <a:t>Endpoints  </a:t>
-            </a:r>
-            <a:r>
-              <a:rPr lang="en-GB" sz="1600" dirty="0">
-                <a:solidFill>
-                  <a:srgbClr val="7030A0"/>
-                </a:solidFill>
-              </a:rPr>
-              <a:t>internally use </a:t>
-            </a:r>
-            <a:r>
-              <a:rPr lang="en-GB" sz="1600" dirty="0" smtClean="0">
-                <a:solidFill>
-                  <a:srgbClr val="7030A0"/>
-                </a:solidFill>
-                <a:latin typeface="Franklin Gothic Medium Cond" panose="020B0606030402020204" pitchFamily="34" charset="0"/>
-                <a:ea typeface="Courier New" charset="0"/>
-                <a:cs typeface="Courier New" charset="0"/>
-              </a:rPr>
-              <a:t>target</a:t>
-            </a:r>
-            <a:r>
-              <a:rPr lang="en-GB" sz="1600" dirty="0" smtClean="0">
-                <a:solidFill>
-                  <a:srgbClr val="7030A0"/>
-                </a:solidFill>
-                <a:ea typeface="Courier New" charset="0"/>
-                <a:cs typeface="Courier New" charset="0"/>
-              </a:rPr>
-              <a:t> </a:t>
-            </a:r>
-            <a:r>
-              <a:rPr lang="en-GB" sz="1600" dirty="0" smtClean="0">
-                <a:solidFill>
-                  <a:srgbClr val="7030A0"/>
-                </a:solidFill>
-              </a:rPr>
-              <a:t>value to </a:t>
-            </a:r>
-            <a:r>
-              <a:rPr lang="en-GB" sz="1600" dirty="0" err="1" smtClean="0">
-                <a:solidFill>
-                  <a:srgbClr val="7030A0"/>
-                </a:solidFill>
-              </a:rPr>
-              <a:t>demux</a:t>
-            </a:r>
-            <a:r>
-              <a:rPr lang="en-GB" sz="1600" dirty="0" smtClean="0">
-                <a:solidFill>
-                  <a:srgbClr val="7030A0"/>
-                </a:solidFill>
-              </a:rPr>
-              <a:t> from multiple instances </a:t>
-            </a:r>
-            <a:r>
-              <a:rPr lang="en-GB" sz="1600" dirty="0">
-                <a:solidFill>
-                  <a:srgbClr val="7030A0"/>
-                </a:solidFill>
-              </a:rPr>
-              <a:t>of the same </a:t>
-            </a:r>
-            <a:r>
-              <a:rPr lang="en-GB" sz="1600" dirty="0" smtClean="0">
-                <a:solidFill>
-                  <a:srgbClr val="7030A0"/>
-                </a:solidFill>
-              </a:rPr>
-              <a:t>feature</a:t>
-            </a:r>
             <a:endParaRPr lang="en-GB" sz="1600" dirty="0">
               <a:solidFill>
                 <a:srgbClr val="7030A0"/>
               </a:solidFill>
             </a:endParaRPr>
           </a:p>
+          <a:p>
+            <a:r>
+              <a:rPr lang="en-GB" sz="1600" dirty="0">
+                <a:solidFill>
+                  <a:srgbClr val="7030A0"/>
+                </a:solidFill>
+              </a:rPr>
+              <a:t>Channels internally use </a:t>
+            </a:r>
+            <a:r>
+              <a:rPr lang="en-GB" sz="1600" dirty="0">
+                <a:solidFill>
+                  <a:srgbClr val="7030A0"/>
+                </a:solidFill>
+                <a:latin typeface="Franklin Gothic Medium Cond" panose="020B0606030402020204" pitchFamily="34" charset="0"/>
+                <a:ea typeface="Courier New" charset="0"/>
+                <a:cs typeface="Courier New" charset="0"/>
+              </a:rPr>
+              <a:t>target</a:t>
+            </a:r>
+            <a:r>
+              <a:rPr lang="en-GB" sz="1600" dirty="0">
+                <a:solidFill>
+                  <a:srgbClr val="7030A0"/>
+                </a:solidFill>
+                <a:ea typeface="Courier New" charset="0"/>
+                <a:cs typeface="Courier New" charset="0"/>
+              </a:rPr>
+              <a:t> </a:t>
+            </a:r>
+            <a:r>
+              <a:rPr lang="en-GB" sz="1600" dirty="0">
+                <a:solidFill>
+                  <a:srgbClr val="7030A0"/>
+                </a:solidFill>
+              </a:rPr>
+              <a:t>value to </a:t>
+            </a:r>
+            <a:r>
+              <a:rPr lang="en-GB" sz="1600" dirty="0" err="1">
+                <a:solidFill>
+                  <a:srgbClr val="7030A0"/>
+                </a:solidFill>
+              </a:rPr>
+              <a:t>demux</a:t>
+            </a:r>
+            <a:r>
+              <a:rPr lang="en-GB" sz="1600" dirty="0">
+                <a:solidFill>
+                  <a:srgbClr val="7030A0"/>
+                </a:solidFill>
+              </a:rPr>
+              <a:t> from multiple instances of the same feature</a:t>
+            </a:r>
+          </a:p>
         </p:txBody>
       </p:sp>
       <p:sp>
@@ -9404,23 +8997,7 @@
                   <a:srgbClr val="7030A0"/>
                 </a:solidFill>
               </a:rPr>
-              <a:t>for </a:t>
-            </a:r>
-            <a:r>
-              <a:rPr lang="en-GB" sz="1600" dirty="0" smtClean="0">
-                <a:solidFill>
-                  <a:srgbClr val="7030A0"/>
-                </a:solidFill>
-              </a:rPr>
-              <a:t>configured </a:t>
-            </a:r>
-            <a:r>
-              <a:rPr lang="en-GB" sz="1600" dirty="0">
-                <a:solidFill>
-                  <a:srgbClr val="7030A0"/>
-                </a:solidFill>
-              </a:rPr>
-              <a:t>features, and</a:t>
+              <a:t>for configured features, and</a:t>
             </a:r>
           </a:p>
           <a:p>
@@ -9455,7 +9032,7 @@
                 <a:ea typeface="Courier New" charset="0"/>
                 <a:cs typeface="Courier New" charset="0"/>
               </a:rPr>
-              <a:t>, endpoint, target)</a:t>
+              <a:t>, channel, target)</a:t>
             </a:r>
           </a:p>
           <a:p>
@@ -9465,23 +9042,7 @@
                   <a:srgbClr val="7030A0"/>
                 </a:solidFill>
               </a:rPr>
-              <a:t>for </a:t>
-            </a:r>
-            <a:r>
-              <a:rPr lang="en-GB" sz="1600" dirty="0" smtClean="0">
-                <a:solidFill>
-                  <a:srgbClr val="7030A0"/>
-                </a:solidFill>
-              </a:rPr>
-              <a:t>dynamic </a:t>
-            </a:r>
-            <a:r>
-              <a:rPr lang="en-GB" sz="1600" dirty="0">
-                <a:solidFill>
-                  <a:srgbClr val="7030A0"/>
-                </a:solidFill>
-              </a:rPr>
-              <a:t>features</a:t>
+              <a:t>for dynamic features</a:t>
             </a:r>
           </a:p>
         </p:txBody>
@@ -9778,13 +9339,6 @@
   <p:clrMapOvr>
     <a:masterClrMapping/>
   </p:clrMapOvr>
-  <p:timing>
-    <p:tnLst>
-      <p:par>
-        <p:cTn id="1" dur="indefinite" restart="never" nodeType="tmRoot"/>
-      </p:par>
-    </p:tnLst>
-  </p:timing>
 </p:sld>
 </file>
 
@@ -9841,7 +9395,7 @@
           <a:p>
             <a:pPr algn="r"/>
             <a:r>
-              <a:rPr lang="en-GB" dirty="0" smtClean="0">
+              <a:rPr lang="en-GB" dirty="0">
                 <a:solidFill>
                   <a:schemeClr val="accent1">
                     <a:lumMod val="50000"/>
@@ -9850,13 +9404,6 @@
               </a:rPr>
               <a:t>Client</a:t>
             </a:r>
-            <a:endParaRPr lang="en-GB" dirty="0">
-              <a:solidFill>
-                <a:schemeClr val="accent1">
-                  <a:lumMod val="50000"/>
-                </a:schemeClr>
-              </a:solidFill>
-            </a:endParaRPr>
           </a:p>
         </p:txBody>
       </p:sp>
@@ -9895,7 +9442,7 @@
           <a:lstStyle/>
           <a:p>
             <a:r>
-              <a:rPr lang="en-GB" dirty="0" smtClean="0">
+              <a:rPr lang="en-GB" dirty="0">
                 <a:solidFill>
                   <a:schemeClr val="accent2">
                     <a:lumMod val="50000"/>
@@ -9904,13 +9451,6 @@
               </a:rPr>
               <a:t>Server</a:t>
             </a:r>
-            <a:endParaRPr lang="en-GB" dirty="0">
-              <a:solidFill>
-                <a:schemeClr val="accent2">
-                  <a:lumMod val="50000"/>
-                </a:schemeClr>
-              </a:solidFill>
-            </a:endParaRPr>
           </a:p>
         </p:txBody>
       </p:sp>
@@ -9964,7 +9504,7 @@
           <a:p>
             <a:pPr algn="ctr"/>
             <a:r>
-              <a:rPr lang="en-GB" dirty="0" err="1" smtClean="0">
+              <a:rPr lang="en-GB" dirty="0" err="1">
                 <a:solidFill>
                   <a:schemeClr val="accent6">
                     <a:lumMod val="50000"/>
@@ -10031,7 +9571,7 @@
           <a:p>
             <a:pPr algn="ctr"/>
             <a:r>
-              <a:rPr lang="en-GB" sz="1400" dirty="0" err="1" smtClean="0">
+              <a:rPr lang="en-GB" sz="1400" dirty="0" err="1">
                 <a:solidFill>
                   <a:schemeClr val="accent2">
                     <a:lumMod val="50000"/>
@@ -10041,7 +9581,7 @@
               <a:t>Websocket</a:t>
             </a:r>
             <a:r>
-              <a:rPr lang="en-GB" sz="1400" dirty="0" smtClean="0">
+              <a:rPr lang="en-GB" sz="1400" dirty="0">
                 <a:solidFill>
                   <a:schemeClr val="accent2">
                     <a:lumMod val="50000"/>
@@ -10054,7 +9594,7 @@
           <a:p>
             <a:pPr algn="ctr"/>
             <a:r>
-              <a:rPr lang="en-GB" sz="1400" dirty="0" smtClean="0">
+              <a:rPr lang="en-GB" sz="1400" dirty="0">
                 <a:solidFill>
                   <a:schemeClr val="accent2">
                     <a:lumMod val="50000"/>
@@ -10063,13 +9603,6 @@
               </a:rPr>
               <a:t>handler</a:t>
             </a:r>
-            <a:endParaRPr lang="en-GB" sz="1400" dirty="0">
-              <a:solidFill>
-                <a:schemeClr val="accent2">
-                  <a:lumMod val="50000"/>
-                </a:schemeClr>
-              </a:solidFill>
-            </a:endParaRPr>
           </a:p>
         </p:txBody>
       </p:sp>
@@ -10121,7 +9654,7 @@
           <a:p>
             <a:pPr algn="ctr"/>
             <a:r>
-              <a:rPr lang="en-GB" sz="1400" dirty="0" smtClean="0">
+              <a:rPr lang="en-GB" sz="1400" dirty="0">
                 <a:solidFill>
                   <a:schemeClr val="accent2">
                     <a:lumMod val="50000"/>
@@ -10130,13 +9663,6 @@
               </a:rPr>
               <a:t>Persistence Feature</a:t>
             </a:r>
-            <a:endParaRPr lang="en-GB" sz="1400" dirty="0">
-              <a:solidFill>
-                <a:schemeClr val="accent2">
-                  <a:lumMod val="50000"/>
-                </a:schemeClr>
-              </a:solidFill>
-            </a:endParaRPr>
           </a:p>
         </p:txBody>
       </p:sp>
@@ -10191,7 +9717,7 @@
           <a:p>
             <a:pPr algn="ctr"/>
             <a:r>
-              <a:rPr lang="en-GB" sz="1400" dirty="0" smtClean="0">
+              <a:rPr lang="en-GB" sz="1400" dirty="0">
                 <a:solidFill>
                   <a:schemeClr val="accent2">
                     <a:lumMod val="60000"/>
@@ -10201,14 +9727,6 @@
               </a:rPr>
               <a:t>Feature2</a:t>
             </a:r>
-            <a:endParaRPr lang="en-GB" sz="1400" dirty="0">
-              <a:solidFill>
-                <a:schemeClr val="accent2">
-                  <a:lumMod val="60000"/>
-                  <a:lumOff val="40000"/>
-                </a:schemeClr>
-              </a:solidFill>
-            </a:endParaRPr>
           </a:p>
         </p:txBody>
       </p:sp>
@@ -10263,7 +9781,7 @@
           <a:p>
             <a:pPr algn="ctr"/>
             <a:r>
-              <a:rPr lang="en-GB" sz="1400" dirty="0" smtClean="0">
+              <a:rPr lang="en-GB" sz="1400" dirty="0">
                 <a:solidFill>
                   <a:schemeClr val="accent2">
                     <a:lumMod val="60000"/>
@@ -10273,14 +9791,6 @@
               </a:rPr>
               <a:t>Feature3</a:t>
             </a:r>
-            <a:endParaRPr lang="en-GB" sz="1400" dirty="0">
-              <a:solidFill>
-                <a:schemeClr val="accent2">
-                  <a:lumMod val="60000"/>
-                  <a:lumOff val="40000"/>
-                </a:schemeClr>
-              </a:solidFill>
-            </a:endParaRPr>
           </a:p>
         </p:txBody>
       </p:sp>
@@ -10457,7 +9967,7 @@
           <a:p>
             <a:pPr algn="ctr"/>
             <a:r>
-              <a:rPr lang="en-GB" sz="1400" dirty="0" err="1" smtClean="0">
+              <a:rPr lang="en-GB" sz="1400" dirty="0" err="1">
                 <a:solidFill>
                   <a:schemeClr val="accent1">
                     <a:lumMod val="75000"/>
@@ -10467,7 +9977,7 @@
               <a:t>Websocket</a:t>
             </a:r>
             <a:r>
-              <a:rPr lang="en-GB" sz="1400" dirty="0" smtClean="0">
+              <a:rPr lang="en-GB" sz="1400" dirty="0">
                 <a:solidFill>
                   <a:schemeClr val="accent1">
                     <a:lumMod val="75000"/>
@@ -10480,7 +9990,7 @@
           <a:p>
             <a:pPr algn="ctr"/>
             <a:r>
-              <a:rPr lang="en-GB" sz="1400" dirty="0" smtClean="0">
+              <a:rPr lang="en-GB" sz="1400" dirty="0">
                 <a:solidFill>
                   <a:schemeClr val="accent1">
                     <a:lumMod val="75000"/>
@@ -10489,13 +9999,6 @@
               </a:rPr>
               <a:t>handler</a:t>
             </a:r>
-            <a:endParaRPr lang="en-GB" sz="1400" dirty="0">
-              <a:solidFill>
-                <a:schemeClr val="accent1">
-                  <a:lumMod val="75000"/>
-                </a:schemeClr>
-              </a:solidFill>
-            </a:endParaRPr>
           </a:p>
         </p:txBody>
       </p:sp>
@@ -10547,18 +10050,13 @@
           <a:p>
             <a:pPr algn="ctr"/>
             <a:r>
-              <a:rPr lang="en-GB" sz="1400" dirty="0" smtClean="0">
+              <a:rPr lang="en-GB" sz="1400" dirty="0">
                 <a:solidFill>
                   <a:srgbClr val="FF00FF"/>
                 </a:solidFill>
               </a:rPr>
-              <a:t>Endpoint2</a:t>
-            </a:r>
-            <a:endParaRPr lang="en-GB" sz="1400" dirty="0">
-              <a:solidFill>
-                <a:srgbClr val="FF00FF"/>
-              </a:solidFill>
-            </a:endParaRPr>
+              <a:t>Channel2</a:t>
+            </a:r>
           </a:p>
         </p:txBody>
       </p:sp>
@@ -10610,18 +10108,13 @@
           <a:p>
             <a:pPr algn="ctr"/>
             <a:r>
-              <a:rPr lang="en-GB" sz="1400" dirty="0" smtClean="0">
+              <a:rPr lang="en-GB" sz="1400" dirty="0">
                 <a:solidFill>
                   <a:srgbClr val="7030A0"/>
                 </a:solidFill>
               </a:rPr>
-              <a:t>Endpoint1</a:t>
-            </a:r>
-            <a:endParaRPr lang="en-GB" sz="1400" dirty="0">
-              <a:solidFill>
-                <a:srgbClr val="7030A0"/>
-              </a:solidFill>
-            </a:endParaRPr>
+              <a:t>Channel1</a:t>
+            </a:r>
           </a:p>
         </p:txBody>
       </p:sp>
@@ -10676,7 +10169,7 @@
           <a:p>
             <a:pPr algn="ctr"/>
             <a:r>
-              <a:rPr lang="en-GB" sz="1400" dirty="0" smtClean="0">
+              <a:rPr lang="en-GB" sz="1400" dirty="0">
                 <a:solidFill>
                   <a:schemeClr val="accent1">
                     <a:lumMod val="60000"/>
@@ -10684,16 +10177,8 @@
                   </a:schemeClr>
                 </a:solidFill>
               </a:rPr>
-              <a:t>Endpoint3</a:t>
-            </a:r>
-            <a:endParaRPr lang="en-GB" sz="1400" dirty="0">
-              <a:solidFill>
-                <a:schemeClr val="accent1">
-                  <a:lumMod val="60000"/>
-                  <a:lumOff val="40000"/>
-                </a:schemeClr>
-              </a:solidFill>
-            </a:endParaRPr>
+              <a:t>Channel3</a:t>
+            </a:r>
           </a:p>
         </p:txBody>
       </p:sp>
@@ -11064,39 +10549,23 @@
           <a:p>
             <a:pPr algn="ctr"/>
             <a:r>
-              <a:rPr lang="en-GB" sz="1600" b="1" dirty="0" smtClean="0">
+              <a:rPr lang="en-GB" sz="1600" b="1" dirty="0">
                 <a:solidFill>
                   <a:srgbClr val="7030A0"/>
                 </a:solidFill>
               </a:rPr>
-              <a:t>Two endpoints using the same </a:t>
-            </a:r>
-            <a:r>
-              <a:rPr lang="en-GB" sz="1600" b="1" dirty="0" smtClean="0">
+              <a:t>Two channels using the same configured feature (</a:t>
+            </a:r>
+            <a:r>
+              <a:rPr lang="en-GB" sz="1600" b="1" dirty="0" err="1">
                 <a:solidFill>
                   <a:srgbClr val="7030A0"/>
                 </a:solidFill>
               </a:rPr>
-              <a:t>configured </a:t>
-            </a:r>
-            <a:r>
-              <a:rPr lang="en-GB" sz="1600" b="1" dirty="0" smtClean="0">
-                <a:solidFill>
-                  <a:srgbClr val="7030A0"/>
-                </a:solidFill>
-              </a:rPr>
-              <a:t>feature (</a:t>
-            </a:r>
-            <a:r>
-              <a:rPr lang="en-GB" sz="1600" b="1" dirty="0" err="1" smtClean="0">
-                <a:solidFill>
-                  <a:srgbClr val="7030A0"/>
-                </a:solidFill>
-              </a:rPr>
               <a:t>eg</a:t>
             </a:r>
             <a:r>
-              <a:rPr lang="en-GB" sz="1600" b="1" dirty="0" smtClean="0">
+              <a:rPr lang="en-GB" sz="1600" b="1" dirty="0">
                 <a:solidFill>
                   <a:srgbClr val="7030A0"/>
                 </a:solidFill>
@@ -11110,7 +10579,7 @@
               <a:buChar char="•"/>
             </a:pPr>
             <a:r>
-              <a:rPr lang="en-GB" sz="1400" dirty="0" smtClean="0">
+              <a:rPr lang="en-GB" sz="1400" dirty="0">
                 <a:solidFill>
                   <a:srgbClr val="7030A0"/>
                 </a:solidFill>
@@ -11118,7 +10587,7 @@
               <a:t>Single feature instance created automatically when the </a:t>
             </a:r>
             <a:r>
-              <a:rPr lang="en-GB" sz="1400" dirty="0" err="1" smtClean="0">
+              <a:rPr lang="en-GB" sz="1400" dirty="0" err="1">
                 <a:solidFill>
                   <a:srgbClr val="7030A0"/>
                 </a:solidFill>
@@ -11126,7 +10595,7 @@
               <a:t>websocket</a:t>
             </a:r>
             <a:r>
-              <a:rPr lang="en-GB" sz="1400" dirty="0" smtClean="0">
+              <a:rPr lang="en-GB" sz="1400" dirty="0">
                 <a:solidFill>
                   <a:srgbClr val="7030A0"/>
                 </a:solidFill>
@@ -11140,7 +10609,7 @@
               <a:buChar char="•"/>
             </a:pPr>
             <a:r>
-              <a:rPr lang="en-GB" sz="1400" dirty="0" smtClean="0">
+              <a:rPr lang="en-GB" sz="1400" dirty="0">
                 <a:solidFill>
                   <a:srgbClr val="7030A0"/>
                 </a:solidFill>
@@ -11148,7 +10617,7 @@
               <a:t>Server-side </a:t>
             </a:r>
             <a:r>
-              <a:rPr lang="en-GB" sz="1400" dirty="0" err="1" smtClean="0">
+              <a:rPr lang="en-GB" sz="1400" dirty="0" err="1">
                 <a:solidFill>
                   <a:srgbClr val="7030A0"/>
                 </a:solidFill>
@@ -11156,7 +10625,7 @@
               <a:t>demux</a:t>
             </a:r>
             <a:r>
-              <a:rPr lang="en-GB" sz="1400" dirty="0" smtClean="0">
+              <a:rPr lang="en-GB" sz="1400" dirty="0">
                 <a:solidFill>
                   <a:srgbClr val="7030A0"/>
                 </a:solidFill>
@@ -11164,7 +10633,7 @@
               <a:t> keyed off </a:t>
             </a:r>
             <a:r>
-              <a:rPr lang="en-GB" sz="1400" dirty="0" err="1" smtClean="0">
+              <a:rPr lang="en-GB" sz="1400" dirty="0" err="1">
                 <a:solidFill>
                   <a:srgbClr val="7030A0"/>
                 </a:solidFill>
@@ -11173,7 +10642,7 @@
               </a:rPr>
               <a:t>req_type</a:t>
             </a:r>
-            <a:endParaRPr lang="en-GB" sz="1400" dirty="0" smtClean="0">
+            <a:endParaRPr lang="en-GB" sz="1400" dirty="0">
               <a:solidFill>
                 <a:srgbClr val="7030A0"/>
               </a:solidFill>
@@ -11185,7 +10654,7 @@
               <a:buChar char="•"/>
             </a:pPr>
             <a:r>
-              <a:rPr lang="en-GB" sz="1400" dirty="0" smtClean="0">
+              <a:rPr lang="en-GB" sz="1400" dirty="0">
                 <a:solidFill>
                   <a:srgbClr val="7030A0"/>
                 </a:solidFill>
@@ -11193,7 +10662,7 @@
               <a:t>Client-side </a:t>
             </a:r>
             <a:r>
-              <a:rPr lang="en-GB" sz="1400" dirty="0" err="1" smtClean="0">
+              <a:rPr lang="en-GB" sz="1400" dirty="0" err="1">
                 <a:solidFill>
                   <a:srgbClr val="7030A0"/>
                 </a:solidFill>
@@ -11201,30 +10670,22 @@
               <a:t>demux</a:t>
             </a:r>
             <a:r>
-              <a:rPr lang="en-GB" sz="1400" dirty="0" smtClean="0">
+              <a:rPr lang="en-GB" sz="1400" dirty="0">
                 <a:solidFill>
                   <a:srgbClr val="7030A0"/>
                 </a:solidFill>
               </a:rPr>
-              <a:t> </a:t>
+              <a:t> keyed off </a:t>
             </a:r>
             <a:r>
               <a:rPr lang="en-GB" sz="1400" dirty="0">
-                <a:solidFill>
-                  <a:srgbClr val="7030A0"/>
-                </a:solidFill>
-              </a:rPr>
-              <a:t>keyed off </a:t>
-            </a:r>
-            <a:r>
-              <a:rPr lang="en-GB" sz="1400" dirty="0" smtClean="0">
                 <a:solidFill>
                   <a:srgbClr val="7030A0"/>
                 </a:solidFill>
                 <a:latin typeface="Franklin Gothic Medium Cond" panose="020B0606030402020204" pitchFamily="34" charset="0"/>
                 <a:cs typeface="Courier New" panose="02070309020205020404" pitchFamily="49" charset="0"/>
               </a:rPr>
-              <a:t>endpoint</a:t>
+              <a:t>channel</a:t>
             </a:r>
             <a:endParaRPr lang="en-GB" sz="1400" dirty="0">
               <a:solidFill>
@@ -11257,13 +10718,6 @@
   <p:clrMapOvr>
     <a:masterClrMapping/>
   </p:clrMapOvr>
-  <p:timing>
-    <p:tnLst>
-      <p:par>
-        <p:cTn id="1" dur="indefinite" restart="never" nodeType="tmRoot"/>
-      </p:par>
-    </p:tnLst>
-  </p:timing>
 </p:sld>
 </file>
 
@@ -11320,7 +10774,7 @@
           <a:p>
             <a:pPr algn="r"/>
             <a:r>
-              <a:rPr lang="en-GB" dirty="0" smtClean="0">
+              <a:rPr lang="en-GB" dirty="0">
                 <a:solidFill>
                   <a:schemeClr val="accent1">
                     <a:lumMod val="50000"/>
@@ -11329,13 +10783,6 @@
               </a:rPr>
               <a:t>Client</a:t>
             </a:r>
-            <a:endParaRPr lang="en-GB" dirty="0">
-              <a:solidFill>
-                <a:schemeClr val="accent1">
-                  <a:lumMod val="50000"/>
-                </a:schemeClr>
-              </a:solidFill>
-            </a:endParaRPr>
           </a:p>
         </p:txBody>
       </p:sp>
@@ -11374,7 +10821,7 @@
           <a:lstStyle/>
           <a:p>
             <a:r>
-              <a:rPr lang="en-GB" dirty="0" smtClean="0">
+              <a:rPr lang="en-GB" dirty="0">
                 <a:solidFill>
                   <a:schemeClr val="accent2">
                     <a:lumMod val="50000"/>
@@ -11383,13 +10830,6 @@
               </a:rPr>
               <a:t>Server</a:t>
             </a:r>
-            <a:endParaRPr lang="en-GB" dirty="0">
-              <a:solidFill>
-                <a:schemeClr val="accent2">
-                  <a:lumMod val="50000"/>
-                </a:schemeClr>
-              </a:solidFill>
-            </a:endParaRPr>
           </a:p>
         </p:txBody>
       </p:sp>
@@ -11443,7 +10883,7 @@
           <a:p>
             <a:pPr algn="ctr"/>
             <a:r>
-              <a:rPr lang="en-GB" dirty="0" err="1" smtClean="0">
+              <a:rPr lang="en-GB" dirty="0" err="1">
                 <a:solidFill>
                   <a:schemeClr val="accent6">
                     <a:lumMod val="50000"/>
@@ -11510,7 +10950,7 @@
           <a:p>
             <a:pPr algn="ctr"/>
             <a:r>
-              <a:rPr lang="en-GB" sz="1400" dirty="0" err="1" smtClean="0">
+              <a:rPr lang="en-GB" sz="1400" dirty="0" err="1">
                 <a:solidFill>
                   <a:schemeClr val="accent2">
                     <a:lumMod val="50000"/>
@@ -11520,7 +10960,7 @@
               <a:t>Websocket</a:t>
             </a:r>
             <a:r>
-              <a:rPr lang="en-GB" sz="1400" dirty="0" smtClean="0">
+              <a:rPr lang="en-GB" sz="1400" dirty="0">
                 <a:solidFill>
                   <a:schemeClr val="accent2">
                     <a:lumMod val="50000"/>
@@ -11533,7 +10973,7 @@
           <a:p>
             <a:pPr algn="ctr"/>
             <a:r>
-              <a:rPr lang="en-GB" sz="1400" dirty="0" smtClean="0">
+              <a:rPr lang="en-GB" sz="1400" dirty="0">
                 <a:solidFill>
                   <a:schemeClr val="accent2">
                     <a:lumMod val="50000"/>
@@ -11542,13 +10982,6 @@
               </a:rPr>
               <a:t>handler</a:t>
             </a:r>
-            <a:endParaRPr lang="en-GB" sz="1400" dirty="0">
-              <a:solidFill>
-                <a:schemeClr val="accent2">
-                  <a:lumMod val="50000"/>
-                </a:schemeClr>
-              </a:solidFill>
-            </a:endParaRPr>
           </a:p>
         </p:txBody>
       </p:sp>
@@ -11603,7 +11036,7 @@
           <a:p>
             <a:pPr algn="ctr"/>
             <a:r>
-              <a:rPr lang="en-GB" sz="1400" dirty="0" smtClean="0">
+              <a:rPr lang="en-GB" sz="1400" dirty="0">
                 <a:solidFill>
                   <a:schemeClr val="accent2">
                     <a:lumMod val="60000"/>
@@ -11613,14 +11046,6 @@
               </a:rPr>
               <a:t>Feature</a:t>
             </a:r>
-            <a:endParaRPr lang="en-GB" sz="1400" dirty="0">
-              <a:solidFill>
-                <a:schemeClr val="accent2">
-                  <a:lumMod val="60000"/>
-                  <a:lumOff val="40000"/>
-                </a:schemeClr>
-              </a:solidFill>
-            </a:endParaRPr>
           </a:p>
         </p:txBody>
       </p:sp>
@@ -11672,7 +11097,7 @@
           <a:p>
             <a:pPr algn="ctr"/>
             <a:r>
-              <a:rPr lang="en-GB" sz="1400" dirty="0" err="1" smtClean="0">
+              <a:rPr lang="en-GB" sz="1400" dirty="0" err="1">
                 <a:solidFill>
                   <a:schemeClr val="accent2">
                     <a:lumMod val="50000"/>
@@ -11682,7 +11107,7 @@
               <a:t>Netconf</a:t>
             </a:r>
             <a:r>
-              <a:rPr lang="en-GB" sz="1400" dirty="0" smtClean="0">
+              <a:rPr lang="en-GB" sz="1400" dirty="0">
                 <a:solidFill>
                   <a:schemeClr val="accent2">
                     <a:lumMod val="50000"/>
@@ -11691,13 +11116,6 @@
               </a:rPr>
               <a:t> Feature</a:t>
             </a:r>
-            <a:endParaRPr lang="en-GB" sz="1400" dirty="0">
-              <a:solidFill>
-                <a:schemeClr val="accent2">
-                  <a:lumMod val="50000"/>
-                </a:schemeClr>
-              </a:solidFill>
-            </a:endParaRPr>
           </a:p>
         </p:txBody>
       </p:sp>
@@ -11749,7 +11167,7 @@
           <a:p>
             <a:pPr algn="ctr"/>
             <a:r>
-              <a:rPr lang="en-GB" sz="1400" dirty="0" err="1" smtClean="0">
+              <a:rPr lang="en-GB" sz="1400" dirty="0" err="1">
                 <a:solidFill>
                   <a:schemeClr val="accent2">
                     <a:lumMod val="50000"/>
@@ -11759,7 +11177,7 @@
               <a:t>Netconf</a:t>
             </a:r>
             <a:r>
-              <a:rPr lang="en-GB" sz="1400" dirty="0" smtClean="0">
+              <a:rPr lang="en-GB" sz="1400" dirty="0">
                 <a:solidFill>
                   <a:schemeClr val="accent2">
                     <a:lumMod val="50000"/>
@@ -11768,13 +11186,6 @@
               </a:rPr>
               <a:t> Feature</a:t>
             </a:r>
-            <a:endParaRPr lang="en-GB" sz="1400" dirty="0">
-              <a:solidFill>
-                <a:schemeClr val="accent2">
-                  <a:lumMod val="50000"/>
-                </a:schemeClr>
-              </a:solidFill>
-            </a:endParaRPr>
           </a:p>
         </p:txBody>
       </p:sp>
@@ -11951,7 +11362,7 @@
           <a:p>
             <a:pPr algn="ctr"/>
             <a:r>
-              <a:rPr lang="en-GB" sz="1400" dirty="0" err="1" smtClean="0">
+              <a:rPr lang="en-GB" sz="1400" dirty="0" err="1">
                 <a:solidFill>
                   <a:schemeClr val="accent1">
                     <a:lumMod val="75000"/>
@@ -11961,7 +11372,7 @@
               <a:t>Websocket</a:t>
             </a:r>
             <a:r>
-              <a:rPr lang="en-GB" sz="1400" dirty="0" smtClean="0">
+              <a:rPr lang="en-GB" sz="1400" dirty="0">
                 <a:solidFill>
                   <a:schemeClr val="accent1">
                     <a:lumMod val="75000"/>
@@ -11974,7 +11385,7 @@
           <a:p>
             <a:pPr algn="ctr"/>
             <a:r>
-              <a:rPr lang="en-GB" sz="1400" dirty="0" smtClean="0">
+              <a:rPr lang="en-GB" sz="1400" dirty="0">
                 <a:solidFill>
                   <a:schemeClr val="accent1">
                     <a:lumMod val="75000"/>
@@ -11983,13 +11394,6 @@
               </a:rPr>
               <a:t>handler</a:t>
             </a:r>
-            <a:endParaRPr lang="en-GB" sz="1400" dirty="0">
-              <a:solidFill>
-                <a:schemeClr val="accent1">
-                  <a:lumMod val="75000"/>
-                </a:schemeClr>
-              </a:solidFill>
-            </a:endParaRPr>
           </a:p>
         </p:txBody>
       </p:sp>
@@ -12041,18 +11445,13 @@
           <a:p>
             <a:pPr algn="ctr"/>
             <a:r>
-              <a:rPr lang="en-GB" sz="1400" dirty="0" smtClean="0">
+              <a:rPr lang="en-GB" sz="1400" dirty="0">
                 <a:solidFill>
                   <a:srgbClr val="FF00FF"/>
                 </a:solidFill>
               </a:rPr>
-              <a:t>Endpoint2</a:t>
-            </a:r>
-            <a:endParaRPr lang="en-GB" sz="1400" dirty="0">
-              <a:solidFill>
-                <a:srgbClr val="FF00FF"/>
-              </a:solidFill>
-            </a:endParaRPr>
+              <a:t>Channel2</a:t>
+            </a:r>
           </a:p>
         </p:txBody>
       </p:sp>
@@ -12104,18 +11503,13 @@
           <a:p>
             <a:pPr algn="ctr"/>
             <a:r>
-              <a:rPr lang="en-GB" sz="1400" dirty="0" smtClean="0">
+              <a:rPr lang="en-GB" sz="1400" dirty="0">
                 <a:solidFill>
                   <a:srgbClr val="7030A0"/>
                 </a:solidFill>
               </a:rPr>
-              <a:t>Endpoint1</a:t>
-            </a:r>
-            <a:endParaRPr lang="en-GB" sz="1400" dirty="0">
-              <a:solidFill>
-                <a:srgbClr val="7030A0"/>
-              </a:solidFill>
-            </a:endParaRPr>
+              <a:t>Channel1</a:t>
+            </a:r>
           </a:p>
         </p:txBody>
       </p:sp>
@@ -12170,7 +11564,7 @@
           <a:p>
             <a:pPr algn="ctr"/>
             <a:r>
-              <a:rPr lang="en-GB" sz="1400" dirty="0" smtClean="0">
+              <a:rPr lang="en-GB" sz="1400" dirty="0">
                 <a:solidFill>
                   <a:schemeClr val="accent1">
                     <a:lumMod val="60000"/>
@@ -12178,16 +11572,8 @@
                   </a:schemeClr>
                 </a:solidFill>
               </a:rPr>
-              <a:t>Endpoint3</a:t>
-            </a:r>
-            <a:endParaRPr lang="en-GB" sz="1400" dirty="0">
-              <a:solidFill>
-                <a:schemeClr val="accent1">
-                  <a:lumMod val="60000"/>
-                  <a:lumOff val="40000"/>
-                </a:schemeClr>
-              </a:solidFill>
-            </a:endParaRPr>
+              <a:t>Channel3</a:t>
+            </a:r>
           </a:p>
         </p:txBody>
       </p:sp>
@@ -12546,8 +11932,8 @@
         </p:nvSpPr>
         <p:spPr>
           <a:xfrm>
-            <a:off x="3423852" y="3932200"/>
-            <a:ext cx="6293839" cy="1446550"/>
+            <a:off x="3530291" y="3932200"/>
+            <a:ext cx="6080960" cy="1446550"/>
           </a:xfrm>
           <a:prstGeom prst="rect">
             <a:avLst/>
@@ -12562,55 +11948,39 @@
           <a:p>
             <a:pPr algn="ctr"/>
             <a:r>
-              <a:rPr lang="en-GB" sz="1600" b="1" dirty="0" smtClean="0">
+              <a:rPr lang="en-GB" sz="1600" b="1" dirty="0">
                 <a:solidFill>
                   <a:srgbClr val="7030A0"/>
                 </a:solidFill>
               </a:rPr>
-              <a:t>Two endpoints using the same </a:t>
-            </a:r>
-            <a:r>
-              <a:rPr lang="en-GB" sz="1600" b="1" dirty="0" smtClean="0">
+              <a:t>Two channels using the same dynamic feature (</a:t>
+            </a:r>
+            <a:r>
+              <a:rPr lang="en-GB" sz="1600" b="1" dirty="0" err="1">
                 <a:solidFill>
                   <a:srgbClr val="7030A0"/>
                 </a:solidFill>
               </a:rPr>
-              <a:t>dynamic </a:t>
-            </a:r>
-            <a:r>
-              <a:rPr lang="en-GB" sz="1600" b="1" dirty="0" smtClean="0">
+              <a:t>eg</a:t>
+            </a:r>
+            <a:r>
+              <a:rPr lang="en-GB" sz="1600" b="1" dirty="0">
                 <a:solidFill>
                   <a:srgbClr val="7030A0"/>
                 </a:solidFill>
               </a:rPr>
-              <a:t>feature (</a:t>
-            </a:r>
-            <a:r>
-              <a:rPr lang="en-GB" sz="1600" b="1" dirty="0" err="1" smtClean="0">
+              <a:t> </a:t>
+            </a:r>
+            <a:r>
+              <a:rPr lang="en-GB" sz="1600" b="1" dirty="0" err="1">
                 <a:solidFill>
                   <a:srgbClr val="7030A0"/>
                 </a:solidFill>
               </a:rPr>
-              <a:t>eg</a:t>
-            </a:r>
-            <a:r>
-              <a:rPr lang="en-GB" sz="1600" b="1" dirty="0" smtClean="0">
-                <a:solidFill>
-                  <a:srgbClr val="7030A0"/>
-                </a:solidFill>
-              </a:rPr>
-              <a:t> </a:t>
-            </a:r>
-            <a:r>
-              <a:rPr lang="en-GB" sz="1600" b="1" dirty="0" err="1" smtClean="0">
-                <a:solidFill>
-                  <a:srgbClr val="7030A0"/>
-                </a:solidFill>
-              </a:rPr>
               <a:t>netconf</a:t>
             </a:r>
             <a:r>
-              <a:rPr lang="en-GB" sz="1600" b="1" dirty="0" smtClean="0">
+              <a:rPr lang="en-GB" sz="1600" b="1" dirty="0">
                 <a:solidFill>
                   <a:srgbClr val="7030A0"/>
                 </a:solidFill>
@@ -12624,15 +11994,15 @@
               <a:buChar char="•"/>
             </a:pPr>
             <a:r>
-              <a:rPr lang="en-GB" sz="1400" dirty="0" smtClean="0">
+              <a:rPr lang="en-GB" sz="1400" dirty="0">
                 <a:solidFill>
                   <a:srgbClr val="7030A0"/>
                 </a:solidFill>
               </a:rPr>
-              <a:t>Two feature instances created when  each endpoint invokes </a:t>
-            </a:r>
-            <a:r>
-              <a:rPr lang="en-GB" sz="1400" dirty="0" err="1" smtClean="0">
+              <a:t>Two feature instances created when  each channel invokes </a:t>
+            </a:r>
+            <a:r>
+              <a:rPr lang="en-GB" sz="1400" dirty="0" err="1">
                 <a:solidFill>
                   <a:srgbClr val="7030A0"/>
                 </a:solidFill>
@@ -12641,7 +12011,7 @@
               </a:rPr>
               <a:t>start_feature</a:t>
             </a:r>
-            <a:endParaRPr lang="en-GB" sz="1400" dirty="0" smtClean="0">
+            <a:endParaRPr lang="en-GB" sz="1400" dirty="0">
               <a:solidFill>
                 <a:srgbClr val="7030A0"/>
               </a:solidFill>
@@ -12676,18 +12046,10 @@
                   <a:srgbClr val="7030A0"/>
                 </a:solidFill>
               </a:rPr>
-              <a:t> keyed off </a:t>
-            </a:r>
-            <a:r>
-              <a:rPr lang="en-GB" sz="1400" dirty="0" smtClean="0">
-                <a:solidFill>
-                  <a:srgbClr val="7030A0"/>
-                </a:solidFill>
-              </a:rPr>
-              <a:t>(</a:t>
-            </a:r>
-            <a:r>
-              <a:rPr lang="en-GB" sz="1400" dirty="0" err="1" smtClean="0">
+              <a:t> keyed off (</a:t>
+            </a:r>
+            <a:r>
+              <a:rPr lang="en-GB" sz="1400" dirty="0" err="1">
                 <a:solidFill>
                   <a:srgbClr val="7030A0"/>
                 </a:solidFill>
@@ -12697,28 +12059,23 @@
               <a:t>req_type</a:t>
             </a:r>
             <a:r>
-              <a:rPr lang="en-GB" sz="1400" dirty="0" smtClean="0">
+              <a:rPr lang="en-GB" sz="1400" dirty="0">
                 <a:solidFill>
                   <a:srgbClr val="7030A0"/>
                 </a:solidFill>
                 <a:latin typeface="Franklin Gothic Medium Cond" panose="020B0606030402020204" pitchFamily="34" charset="0"/>
                 <a:cs typeface="Courier New" panose="02070309020205020404" pitchFamily="49" charset="0"/>
               </a:rPr>
-              <a:t>, endpoint, target)</a:t>
-            </a:r>
-            <a:r>
-              <a:rPr lang="en-GB" sz="1400" dirty="0" smtClean="0">
+              <a:t>, channel, target)</a:t>
+            </a:r>
+            <a:r>
+              <a:rPr lang="en-GB" sz="1400" dirty="0">
                 <a:solidFill>
                   <a:srgbClr val="7030A0"/>
                 </a:solidFill>
               </a:rPr>
               <a:t> </a:t>
             </a:r>
-            <a:endParaRPr lang="en-GB" sz="1400" dirty="0">
-              <a:solidFill>
-                <a:srgbClr val="7030A0"/>
-              </a:solidFill>
-            </a:endParaRPr>
           </a:p>
           <a:p>
             <a:pPr marL="285750" indent="-285750">
@@ -12726,7 +12083,7 @@
               <a:buChar char="•"/>
             </a:pPr>
             <a:r>
-              <a:rPr lang="en-GB" sz="1400" dirty="0" smtClean="0">
+              <a:rPr lang="en-GB" sz="1400" dirty="0">
                 <a:solidFill>
                   <a:srgbClr val="7030A0"/>
                 </a:solidFill>
@@ -12734,7 +12091,7 @@
               <a:t>Client-side </a:t>
             </a:r>
             <a:r>
-              <a:rPr lang="en-GB" sz="1400" dirty="0" err="1" smtClean="0">
+              <a:rPr lang="en-GB" sz="1400" dirty="0" err="1">
                 <a:solidFill>
                   <a:srgbClr val="7030A0"/>
                 </a:solidFill>
@@ -12742,7 +12099,7 @@
               <a:t>demux</a:t>
             </a:r>
             <a:r>
-              <a:rPr lang="en-GB" sz="1400" dirty="0" smtClean="0">
+              <a:rPr lang="en-GB" sz="1400" dirty="0">
                 <a:solidFill>
                   <a:srgbClr val="7030A0"/>
                 </a:solidFill>
@@ -12750,7 +12107,7 @@
               <a:t> keyed off </a:t>
             </a:r>
             <a:r>
-              <a:rPr lang="en-GB" sz="1400" dirty="0" smtClean="0">
+              <a:rPr lang="en-GB" sz="1400" dirty="0">
                 <a:solidFill>
                   <a:srgbClr val="7030A0"/>
                 </a:solidFill>
@@ -12758,20 +12115,12 @@
                 <a:ea typeface="Courier New" charset="0"/>
                 <a:cs typeface="Courier New" charset="0"/>
               </a:rPr>
-              <a:t>endpoint</a:t>
-            </a:r>
+              <a:t>channel</a:t>
+            </a:r>
+          </a:p>
+          <a:p>
+            <a:pPr algn="ctr"/>
             <a:endParaRPr lang="en-GB" sz="1400" dirty="0">
-              <a:solidFill>
-                <a:srgbClr val="7030A0"/>
-              </a:solidFill>
-              <a:latin typeface="Franklin Gothic Medium Cond" panose="020B0606030402020204" pitchFamily="34" charset="0"/>
-              <a:ea typeface="Courier New" charset="0"/>
-              <a:cs typeface="Courier New" charset="0"/>
-            </a:endParaRPr>
-          </a:p>
-          <a:p>
-            <a:pPr algn="ctr"/>
-            <a:endParaRPr lang="en-GB" sz="1400" dirty="0" smtClean="0">
               <a:solidFill>
                 <a:srgbClr val="7030A0"/>
               </a:solidFill>
@@ -12799,13 +12148,6 @@
   <p:clrMapOvr>
     <a:masterClrMapping/>
   </p:clrMapOvr>
-  <p:timing>
-    <p:tnLst>
-      <p:par>
-        <p:cTn id="1" dur="indefinite" restart="never" nodeType="tmRoot"/>
-      </p:par>
-    </p:tnLst>
-  </p:timing>
 </p:sld>
 </file>
 
@@ -12862,7 +12204,7 @@
           <a:p>
             <a:pPr algn="r"/>
             <a:r>
-              <a:rPr lang="en-GB" dirty="0" smtClean="0">
+              <a:rPr lang="en-GB" dirty="0">
                 <a:solidFill>
                   <a:schemeClr val="accent1">
                     <a:lumMod val="50000"/>
@@ -12871,13 +12213,6 @@
               </a:rPr>
               <a:t>Client</a:t>
             </a:r>
-            <a:endParaRPr lang="en-GB" dirty="0">
-              <a:solidFill>
-                <a:schemeClr val="accent1">
-                  <a:lumMod val="50000"/>
-                </a:schemeClr>
-              </a:solidFill>
-            </a:endParaRPr>
           </a:p>
         </p:txBody>
       </p:sp>
@@ -12916,7 +12251,7 @@
           <a:lstStyle/>
           <a:p>
             <a:r>
-              <a:rPr lang="en-GB" dirty="0" smtClean="0">
+              <a:rPr lang="en-GB" dirty="0">
                 <a:solidFill>
                   <a:schemeClr val="accent2">
                     <a:lumMod val="50000"/>
@@ -12925,13 +12260,6 @@
               </a:rPr>
               <a:t>Server</a:t>
             </a:r>
-            <a:endParaRPr lang="en-GB" dirty="0">
-              <a:solidFill>
-                <a:schemeClr val="accent2">
-                  <a:lumMod val="50000"/>
-                </a:schemeClr>
-              </a:solidFill>
-            </a:endParaRPr>
           </a:p>
         </p:txBody>
       </p:sp>
@@ -12985,7 +12313,7 @@
           <a:p>
             <a:pPr algn="ctr"/>
             <a:r>
-              <a:rPr lang="en-GB" dirty="0" err="1" smtClean="0">
+              <a:rPr lang="en-GB" dirty="0" err="1">
                 <a:solidFill>
                   <a:schemeClr val="accent6">
                     <a:lumMod val="50000"/>
@@ -13052,7 +12380,7 @@
           <a:p>
             <a:pPr algn="ctr"/>
             <a:r>
-              <a:rPr lang="en-GB" sz="1400" dirty="0" err="1" smtClean="0">
+              <a:rPr lang="en-GB" sz="1400" dirty="0" err="1">
                 <a:solidFill>
                   <a:schemeClr val="accent2">
                     <a:lumMod val="50000"/>
@@ -13062,7 +12390,7 @@
               <a:t>Websocket</a:t>
             </a:r>
             <a:r>
-              <a:rPr lang="en-GB" sz="1400" dirty="0" smtClean="0">
+              <a:rPr lang="en-GB" sz="1400" dirty="0">
                 <a:solidFill>
                   <a:schemeClr val="accent2">
                     <a:lumMod val="50000"/>
@@ -13075,7 +12403,7 @@
           <a:p>
             <a:pPr algn="ctr"/>
             <a:r>
-              <a:rPr lang="en-GB" sz="1400" dirty="0" smtClean="0">
+              <a:rPr lang="en-GB" sz="1400" dirty="0">
                 <a:solidFill>
                   <a:schemeClr val="accent2">
                     <a:lumMod val="50000"/>
@@ -13084,13 +12412,6 @@
               </a:rPr>
               <a:t>handler</a:t>
             </a:r>
-            <a:endParaRPr lang="en-GB" sz="1400" dirty="0">
-              <a:solidFill>
-                <a:schemeClr val="accent2">
-                  <a:lumMod val="50000"/>
-                </a:schemeClr>
-              </a:solidFill>
-            </a:endParaRPr>
           </a:p>
         </p:txBody>
       </p:sp>
@@ -13145,7 +12466,7 @@
           <a:p>
             <a:pPr algn="ctr"/>
             <a:r>
-              <a:rPr lang="en-GB" sz="1400" dirty="0" smtClean="0">
+              <a:rPr lang="en-GB" sz="1400" dirty="0">
                 <a:solidFill>
                   <a:schemeClr val="accent2">
                     <a:lumMod val="60000"/>
@@ -13155,14 +12476,6 @@
               </a:rPr>
               <a:t>Feature</a:t>
             </a:r>
-            <a:endParaRPr lang="en-GB" sz="1400" dirty="0">
-              <a:solidFill>
-                <a:schemeClr val="accent2">
-                  <a:lumMod val="60000"/>
-                  <a:lumOff val="40000"/>
-                </a:schemeClr>
-              </a:solidFill>
-            </a:endParaRPr>
           </a:p>
         </p:txBody>
       </p:sp>
@@ -13214,7 +12527,7 @@
           <a:p>
             <a:pPr algn="ctr"/>
             <a:r>
-              <a:rPr lang="en-GB" sz="1400" dirty="0" err="1" smtClean="0">
+              <a:rPr lang="en-GB" sz="1400" dirty="0" err="1">
                 <a:solidFill>
                   <a:srgbClr val="7030A0"/>
                 </a:solidFill>
@@ -13222,18 +12535,13 @@
               <a:t>Netconf</a:t>
             </a:r>
             <a:r>
-              <a:rPr lang="en-GB" sz="1400" dirty="0" smtClean="0">
+              <a:rPr lang="en-GB" sz="1400" dirty="0">
                 <a:solidFill>
                   <a:srgbClr val="7030A0"/>
                 </a:solidFill>
               </a:rPr>
               <a:t> Feature</a:t>
             </a:r>
-            <a:endParaRPr lang="en-GB" sz="1400" dirty="0">
-              <a:solidFill>
-                <a:srgbClr val="7030A0"/>
-              </a:solidFill>
-            </a:endParaRPr>
           </a:p>
         </p:txBody>
       </p:sp>
@@ -13285,7 +12593,7 @@
           <a:p>
             <a:pPr algn="ctr"/>
             <a:r>
-              <a:rPr lang="en-GB" sz="1400" dirty="0" err="1" smtClean="0">
+              <a:rPr lang="en-GB" sz="1400" dirty="0" err="1">
                 <a:solidFill>
                   <a:srgbClr val="FF00FF"/>
                 </a:solidFill>
@@ -13293,18 +12601,13 @@
               <a:t>Netconf</a:t>
             </a:r>
             <a:r>
-              <a:rPr lang="en-GB" sz="1400" dirty="0" smtClean="0">
+              <a:rPr lang="en-GB" sz="1400" dirty="0">
                 <a:solidFill>
                   <a:srgbClr val="FF00FF"/>
                 </a:solidFill>
               </a:rPr>
               <a:t> Feature</a:t>
             </a:r>
-            <a:endParaRPr lang="en-GB" sz="1400" dirty="0">
-              <a:solidFill>
-                <a:srgbClr val="FF00FF"/>
-              </a:solidFill>
-            </a:endParaRPr>
           </a:p>
         </p:txBody>
       </p:sp>
@@ -13481,7 +12784,7 @@
           <a:p>
             <a:pPr algn="ctr"/>
             <a:r>
-              <a:rPr lang="en-GB" sz="1400" dirty="0" err="1" smtClean="0">
+              <a:rPr lang="en-GB" sz="1400" dirty="0" err="1">
                 <a:solidFill>
                   <a:schemeClr val="accent1">
                     <a:lumMod val="75000"/>
@@ -13491,7 +12794,7 @@
               <a:t>Websocket</a:t>
             </a:r>
             <a:r>
-              <a:rPr lang="en-GB" sz="1400" dirty="0" smtClean="0">
+              <a:rPr lang="en-GB" sz="1400" dirty="0">
                 <a:solidFill>
                   <a:schemeClr val="accent1">
                     <a:lumMod val="75000"/>
@@ -13504,7 +12807,7 @@
           <a:p>
             <a:pPr algn="ctr"/>
             <a:r>
-              <a:rPr lang="en-GB" sz="1400" dirty="0" smtClean="0">
+              <a:rPr lang="en-GB" sz="1400" dirty="0">
                 <a:solidFill>
                   <a:schemeClr val="accent1">
                     <a:lumMod val="75000"/>
@@ -13513,13 +12816,6 @@
               </a:rPr>
               <a:t>handler</a:t>
             </a:r>
-            <a:endParaRPr lang="en-GB" sz="1400" dirty="0">
-              <a:solidFill>
-                <a:schemeClr val="accent1">
-                  <a:lumMod val="75000"/>
-                </a:schemeClr>
-              </a:solidFill>
-            </a:endParaRPr>
           </a:p>
         </p:txBody>
       </p:sp>
@@ -13574,7 +12870,7 @@
           <a:p>
             <a:pPr algn="ctr"/>
             <a:r>
-              <a:rPr lang="en-GB" sz="1400" dirty="0" smtClean="0">
+              <a:rPr lang="en-GB" sz="1400" dirty="0">
                 <a:solidFill>
                   <a:schemeClr val="accent1">
                     <a:lumMod val="60000"/>
@@ -13582,16 +12878,8 @@
                   </a:schemeClr>
                 </a:solidFill>
               </a:rPr>
-              <a:t>Endpoint2</a:t>
-            </a:r>
-            <a:endParaRPr lang="en-GB" sz="1400" dirty="0">
-              <a:solidFill>
-                <a:schemeClr val="accent1">
-                  <a:lumMod val="60000"/>
-                  <a:lumOff val="40000"/>
-                </a:schemeClr>
-              </a:solidFill>
-            </a:endParaRPr>
+              <a:t>Channel2</a:t>
+            </a:r>
           </a:p>
         </p:txBody>
       </p:sp>
@@ -13643,22 +12931,15 @@
           <a:p>
             <a:pPr algn="ctr"/>
             <a:r>
-              <a:rPr lang="en-GB" sz="1400" dirty="0" smtClean="0">
+              <a:rPr lang="en-GB" sz="1400" dirty="0">
                 <a:solidFill>
                   <a:schemeClr val="accent1">
                     <a:lumMod val="50000"/>
                   </a:schemeClr>
                 </a:solidFill>
               </a:rPr>
-              <a:t>Endpoint1</a:t>
-            </a:r>
-            <a:endParaRPr lang="en-GB" sz="1400" dirty="0">
-              <a:solidFill>
-                <a:schemeClr val="accent1">
-                  <a:lumMod val="50000"/>
-                </a:schemeClr>
-              </a:solidFill>
-            </a:endParaRPr>
+              <a:t>Channel1</a:t>
+            </a:r>
           </a:p>
         </p:txBody>
       </p:sp>
@@ -13713,7 +12994,7 @@
           <a:p>
             <a:pPr algn="ctr"/>
             <a:r>
-              <a:rPr lang="en-GB" sz="1400" dirty="0" smtClean="0">
+              <a:rPr lang="en-GB" sz="1400" dirty="0">
                 <a:solidFill>
                   <a:schemeClr val="accent1">
                     <a:lumMod val="60000"/>
@@ -13721,16 +13002,8 @@
                   </a:schemeClr>
                 </a:solidFill>
               </a:rPr>
-              <a:t>Endpoint3</a:t>
-            </a:r>
-            <a:endParaRPr lang="en-GB" sz="1400" dirty="0">
-              <a:solidFill>
-                <a:schemeClr val="accent1">
-                  <a:lumMod val="60000"/>
-                  <a:lumOff val="40000"/>
-                </a:schemeClr>
-              </a:solidFill>
-            </a:endParaRPr>
+              <a:t>Channel3</a:t>
+            </a:r>
           </a:p>
         </p:txBody>
       </p:sp>
@@ -14104,55 +13377,39 @@
           <a:p>
             <a:pPr algn="ctr"/>
             <a:r>
-              <a:rPr lang="en-GB" sz="1600" b="1" dirty="0" smtClean="0">
+              <a:rPr lang="en-GB" sz="1600" b="1" dirty="0">
                 <a:solidFill>
                   <a:srgbClr val="7030A0"/>
                 </a:solidFill>
               </a:rPr>
-              <a:t>One endpoint using the same </a:t>
-            </a:r>
-            <a:r>
-              <a:rPr lang="en-GB" sz="1600" b="1" dirty="0" smtClean="0">
+              <a:t>One channel using the same dynamic feature (</a:t>
+            </a:r>
+            <a:r>
+              <a:rPr lang="en-GB" sz="1600" b="1" dirty="0" err="1">
                 <a:solidFill>
                   <a:srgbClr val="7030A0"/>
                 </a:solidFill>
               </a:rPr>
-              <a:t>dynamic </a:t>
-            </a:r>
-            <a:r>
-              <a:rPr lang="en-GB" sz="1600" b="1" dirty="0" smtClean="0">
+              <a:t>eg</a:t>
+            </a:r>
+            <a:r>
+              <a:rPr lang="en-GB" sz="1600" b="1" dirty="0">
                 <a:solidFill>
                   <a:srgbClr val="7030A0"/>
                 </a:solidFill>
               </a:rPr>
-              <a:t>feature (</a:t>
-            </a:r>
-            <a:r>
-              <a:rPr lang="en-GB" sz="1600" b="1" dirty="0" err="1" smtClean="0">
+              <a:t> </a:t>
+            </a:r>
+            <a:r>
+              <a:rPr lang="en-GB" sz="1600" b="1" dirty="0" err="1">
                 <a:solidFill>
                   <a:srgbClr val="7030A0"/>
                 </a:solidFill>
               </a:rPr>
-              <a:t>eg</a:t>
-            </a:r>
-            <a:r>
-              <a:rPr lang="en-GB" sz="1600" b="1" dirty="0" smtClean="0">
-                <a:solidFill>
-                  <a:srgbClr val="7030A0"/>
-                </a:solidFill>
-              </a:rPr>
-              <a:t> </a:t>
-            </a:r>
-            <a:r>
-              <a:rPr lang="en-GB" sz="1600" b="1" dirty="0" err="1" smtClean="0">
-                <a:solidFill>
-                  <a:srgbClr val="7030A0"/>
-                </a:solidFill>
-              </a:rPr>
               <a:t>netconf</a:t>
             </a:r>
             <a:r>
-              <a:rPr lang="en-GB" sz="1600" b="1" dirty="0" smtClean="0">
+              <a:rPr lang="en-GB" sz="1600" b="1" dirty="0">
                 <a:solidFill>
                   <a:srgbClr val="7030A0"/>
                 </a:solidFill>
@@ -14166,15 +13423,15 @@
               <a:buChar char="•"/>
             </a:pPr>
             <a:r>
-              <a:rPr lang="en-GB" sz="1400" dirty="0" smtClean="0">
+              <a:rPr lang="en-GB" sz="1400" dirty="0">
                 <a:solidFill>
                   <a:srgbClr val="7030A0"/>
                 </a:solidFill>
               </a:rPr>
-              <a:t>Two feature instances created when the endpoint invokes </a:t>
-            </a:r>
-            <a:r>
-              <a:rPr lang="en-GB" sz="1400" dirty="0" err="1" smtClean="0">
+              <a:t>Two feature instances created when the channel invokes </a:t>
+            </a:r>
+            <a:r>
+              <a:rPr lang="en-GB" sz="1400" dirty="0" err="1">
                 <a:solidFill>
                   <a:srgbClr val="7030A0"/>
                 </a:solidFill>
@@ -14184,7 +13441,7 @@
               <a:t>start_feature</a:t>
             </a:r>
             <a:r>
-              <a:rPr lang="en-GB" sz="1400" dirty="0" smtClean="0">
+              <a:rPr lang="en-GB" sz="1400" dirty="0">
                 <a:solidFill>
                   <a:srgbClr val="7030A0"/>
                 </a:solidFill>
@@ -14192,7 +13449,7 @@
               <a:t> for the same </a:t>
             </a:r>
             <a:r>
-              <a:rPr lang="en-GB" sz="1400" dirty="0" smtClean="0">
+              <a:rPr lang="en-GB" sz="1400" dirty="0">
                 <a:solidFill>
                   <a:srgbClr val="7030A0"/>
                 </a:solidFill>
@@ -14203,7 +13460,7 @@
               <a:t>feature</a:t>
             </a:r>
             <a:r>
-              <a:rPr lang="en-GB" sz="1400" dirty="0" smtClean="0">
+              <a:rPr lang="en-GB" sz="1400" dirty="0">
                 <a:solidFill>
                   <a:srgbClr val="7030A0"/>
                 </a:solidFill>
@@ -14211,7 +13468,7 @@
               <a:t> (</a:t>
             </a:r>
             <a:r>
-              <a:rPr lang="en-GB" sz="1400" dirty="0" err="1" smtClean="0">
+              <a:rPr lang="en-GB" sz="1400" dirty="0" err="1">
                 <a:solidFill>
                   <a:srgbClr val="7030A0"/>
                 </a:solidFill>
@@ -14219,7 +13476,7 @@
               <a:t>eg</a:t>
             </a:r>
             <a:r>
-              <a:rPr lang="en-GB" sz="1400" dirty="0" smtClean="0">
+              <a:rPr lang="en-GB" sz="1400" dirty="0">
                 <a:solidFill>
                   <a:srgbClr val="7030A0"/>
                 </a:solidFill>
@@ -14227,7 +13484,7 @@
               <a:t> “</a:t>
             </a:r>
             <a:r>
-              <a:rPr lang="en-GB" sz="1400" dirty="0" err="1" smtClean="0">
+              <a:rPr lang="en-GB" sz="1400" dirty="0" err="1">
                 <a:solidFill>
                   <a:srgbClr val="7030A0"/>
                 </a:solidFill>
@@ -14238,7 +13495,7 @@
               <a:t>netconf</a:t>
             </a:r>
             <a:r>
-              <a:rPr lang="en-GB" sz="1400" dirty="0" smtClean="0">
+              <a:rPr lang="en-GB" sz="1400" dirty="0">
                 <a:solidFill>
                   <a:srgbClr val="7030A0"/>
                 </a:solidFill>
@@ -14249,7 +13506,7 @@
               <a:t>”</a:t>
             </a:r>
             <a:r>
-              <a:rPr lang="en-GB" sz="1400" dirty="0" smtClean="0">
+              <a:rPr lang="en-GB" sz="1400" dirty="0">
                 <a:solidFill>
                   <a:srgbClr val="7030A0"/>
                 </a:solidFill>
@@ -14257,7 +13514,7 @@
               <a:t>) and two distinct </a:t>
             </a:r>
             <a:r>
-              <a:rPr lang="en-GB" sz="1400" dirty="0" smtClean="0">
+              <a:rPr lang="en-GB" sz="1400" dirty="0">
                 <a:solidFill>
                   <a:srgbClr val="7030A0"/>
                 </a:solidFill>
@@ -14268,7 +13525,7 @@
               <a:t>target</a:t>
             </a:r>
             <a:r>
-              <a:rPr lang="en-GB" sz="1400" dirty="0" smtClean="0">
+              <a:rPr lang="en-GB" sz="1400" dirty="0">
                 <a:solidFill>
                   <a:srgbClr val="7030A0"/>
                 </a:solidFill>
@@ -14276,7 +13533,7 @@
               <a:t> values (</a:t>
             </a:r>
             <a:r>
-              <a:rPr lang="en-GB" sz="1400" dirty="0" err="1" smtClean="0">
+              <a:rPr lang="en-GB" sz="1400" dirty="0" err="1">
                 <a:solidFill>
                   <a:srgbClr val="7030A0"/>
                 </a:solidFill>
@@ -14284,7 +13541,7 @@
               <a:t>eg</a:t>
             </a:r>
             <a:r>
-              <a:rPr lang="en-GB" sz="1400" dirty="0" smtClean="0">
+              <a:rPr lang="en-GB" sz="1400" dirty="0">
                 <a:solidFill>
                   <a:srgbClr val="7030A0"/>
                 </a:solidFill>
@@ -14292,7 +13549,7 @@
               <a:t> </a:t>
             </a:r>
             <a:r>
-              <a:rPr lang="en-GB" sz="1400" dirty="0" smtClean="0">
+              <a:rPr lang="en-GB" sz="1400" dirty="0">
                 <a:solidFill>
                   <a:srgbClr val="7030A0"/>
                 </a:solidFill>
@@ -14303,7 +13560,7 @@
               <a:t>“router1”</a:t>
             </a:r>
             <a:r>
-              <a:rPr lang="en-GB" sz="1400" dirty="0" smtClean="0">
+              <a:rPr lang="en-GB" sz="1400" dirty="0">
                 <a:solidFill>
                   <a:srgbClr val="7030A0"/>
                 </a:solidFill>
@@ -14311,7 +13568,7 @@
               <a:t> and </a:t>
             </a:r>
             <a:r>
-              <a:rPr lang="en-GB" sz="1400" dirty="0" smtClean="0">
+              <a:rPr lang="en-GB" sz="1400" dirty="0">
                 <a:solidFill>
                   <a:srgbClr val="7030A0"/>
                 </a:solidFill>
@@ -14322,7 +13579,7 @@
               <a:t>“router2”</a:t>
             </a:r>
             <a:r>
-              <a:rPr lang="en-GB" sz="1400" dirty="0" smtClean="0">
+              <a:rPr lang="en-GB" sz="1400" dirty="0">
                 <a:solidFill>
                   <a:srgbClr val="7030A0"/>
                 </a:solidFill>
@@ -14336,7 +13593,7 @@
               <a:buChar char="•"/>
             </a:pPr>
             <a:r>
-              <a:rPr lang="en-GB" sz="1400" dirty="0" smtClean="0">
+              <a:rPr lang="en-GB" sz="1400" dirty="0">
                 <a:solidFill>
                   <a:srgbClr val="7030A0"/>
                 </a:solidFill>
@@ -14357,18 +13614,10 @@
                   <a:srgbClr val="7030A0"/>
                 </a:solidFill>
               </a:rPr>
-              <a:t> keyed off </a:t>
-            </a:r>
-            <a:r>
-              <a:rPr lang="en-GB" sz="1400" dirty="0" smtClean="0">
-                <a:solidFill>
-                  <a:srgbClr val="7030A0"/>
-                </a:solidFill>
-              </a:rPr>
-              <a:t>(</a:t>
-            </a:r>
-            <a:r>
-              <a:rPr lang="en-GB" sz="1400" dirty="0" err="1" smtClean="0">
+              <a:t> keyed off (</a:t>
+            </a:r>
+            <a:r>
+              <a:rPr lang="en-GB" sz="1400" dirty="0" err="1">
                 <a:solidFill>
                   <a:srgbClr val="7030A0"/>
                 </a:solidFill>
@@ -14378,17 +13627,17 @@
               <a:t>req_type</a:t>
             </a:r>
             <a:r>
-              <a:rPr lang="en-GB" sz="1400" dirty="0" smtClean="0">
+              <a:rPr lang="en-GB" sz="1400" dirty="0">
                 <a:solidFill>
                   <a:srgbClr val="7030A0"/>
                 </a:solidFill>
                 <a:latin typeface="Franklin Gothic Medium Cond" panose="020B0606030402020204" pitchFamily="34" charset="0"/>
                 <a:cs typeface="Courier New" panose="02070309020205020404" pitchFamily="49" charset="0"/>
               </a:rPr>
-              <a:t>, endpoint, target)</a:t>
-            </a:r>
-            <a:r>
-              <a:rPr lang="en-GB" sz="1400" dirty="0" smtClean="0">
+              <a:t>, channel, target)</a:t>
+            </a:r>
+            <a:r>
+              <a:rPr lang="en-GB" sz="1400" dirty="0">
                 <a:solidFill>
                   <a:srgbClr val="7030A0"/>
                 </a:solidFill>
@@ -14402,7 +13651,7 @@
               <a:buChar char="•"/>
             </a:pPr>
             <a:r>
-              <a:rPr lang="en-GB" sz="1400" dirty="0" smtClean="0">
+              <a:rPr lang="en-GB" sz="1400" dirty="0">
                 <a:solidFill>
                   <a:srgbClr val="7030A0"/>
                 </a:solidFill>
@@ -14410,7 +13659,7 @@
               <a:t>Client-side </a:t>
             </a:r>
             <a:r>
-              <a:rPr lang="en-GB" sz="1400" dirty="0" err="1" smtClean="0">
+              <a:rPr lang="en-GB" sz="1400" dirty="0" err="1">
                 <a:solidFill>
                   <a:srgbClr val="7030A0"/>
                 </a:solidFill>
@@ -14418,7 +13667,7 @@
               <a:t>demux</a:t>
             </a:r>
             <a:r>
-              <a:rPr lang="en-GB" sz="1400" dirty="0" smtClean="0">
+              <a:rPr lang="en-GB" sz="1400" dirty="0">
                 <a:solidFill>
                   <a:srgbClr val="7030A0"/>
                 </a:solidFill>
@@ -14426,7 +13675,7 @@
               <a:t> keyed off just </a:t>
             </a:r>
             <a:r>
-              <a:rPr lang="en-GB" sz="1400" dirty="0" smtClean="0">
+              <a:rPr lang="en-GB" sz="1400" dirty="0">
                 <a:solidFill>
                   <a:srgbClr val="7030A0"/>
                 </a:solidFill>
@@ -14434,9 +13683,9 @@
                 <a:ea typeface="Courier New" charset="0"/>
                 <a:cs typeface="Courier New" charset="0"/>
               </a:rPr>
-              <a:t>endpoint</a:t>
-            </a:r>
-            <a:endParaRPr lang="en-GB" sz="1400" dirty="0" smtClean="0">
+              <a:t>channel</a:t>
+            </a:r>
+            <a:endParaRPr lang="en-GB" sz="1400" dirty="0">
               <a:solidFill>
                 <a:srgbClr val="7030A0"/>
               </a:solidFill>
@@ -14448,7 +13697,7 @@
               <a:buChar char="•"/>
             </a:pPr>
             <a:r>
-              <a:rPr lang="en-GB" sz="1400" dirty="0" smtClean="0">
+              <a:rPr lang="en-GB" sz="1400" dirty="0">
                 <a:solidFill>
                   <a:srgbClr val="7030A0"/>
                 </a:solidFill>
@@ -14456,7 +13705,7 @@
               <a:t>Notifications have </a:t>
             </a:r>
             <a:r>
-              <a:rPr lang="en-GB" sz="1400" dirty="0" smtClean="0">
+              <a:rPr lang="en-GB" sz="1400" dirty="0">
                 <a:solidFill>
                   <a:srgbClr val="7030A0"/>
                 </a:solidFill>
@@ -14467,7 +13716,7 @@
               <a:t>target</a:t>
             </a:r>
             <a:r>
-              <a:rPr lang="en-GB" sz="1400" dirty="0" smtClean="0">
+              <a:rPr lang="en-GB" sz="1400" dirty="0">
                 <a:solidFill>
                   <a:srgbClr val="7030A0"/>
                 </a:solidFill>
@@ -14475,7 +13724,7 @@
               <a:t> set to either </a:t>
             </a:r>
             <a:r>
-              <a:rPr lang="en-GB" sz="1400" dirty="0" smtClean="0">
+              <a:rPr lang="en-GB" sz="1400" dirty="0">
                 <a:solidFill>
                   <a:srgbClr val="7030A0"/>
                 </a:solidFill>
@@ -14486,7 +13735,7 @@
               <a:t>“router1”</a:t>
             </a:r>
             <a:r>
-              <a:rPr lang="en-GB" sz="1400" dirty="0" smtClean="0">
+              <a:rPr lang="en-GB" sz="1400" dirty="0">
                 <a:solidFill>
                   <a:srgbClr val="7030A0"/>
                 </a:solidFill>
@@ -14494,7 +13743,7 @@
               <a:t> or </a:t>
             </a:r>
             <a:r>
-              <a:rPr lang="en-GB" sz="1400" dirty="0" smtClean="0">
+              <a:rPr lang="en-GB" sz="1400" dirty="0">
                 <a:solidFill>
                   <a:srgbClr val="7030A0"/>
                 </a:solidFill>
@@ -14505,12 +13754,12 @@
               <a:t>“router2”</a:t>
             </a:r>
             <a:r>
-              <a:rPr lang="en-GB" sz="1400" dirty="0" smtClean="0">
+              <a:rPr lang="en-GB" sz="1400" dirty="0">
                 <a:solidFill>
                   <a:srgbClr val="7030A0"/>
                 </a:solidFill>
               </a:rPr>
-              <a:t>, so endpoint can internally disambiguate</a:t>
+              <a:t>, so channel can internally disambiguate</a:t>
             </a:r>
           </a:p>
           <a:p>
@@ -14548,18 +13797,13 @@
           <a:lstStyle/>
           <a:p>
             <a:r>
-              <a:rPr lang="en-US" sz="1400" smtClean="0">
+              <a:rPr lang="en-US" sz="1400">
                 <a:solidFill>
                   <a:srgbClr val="7030A0"/>
                 </a:solidFill>
               </a:rPr>
               <a:t>target=”router1”</a:t>
             </a:r>
-            <a:endParaRPr lang="en-US" sz="1400">
-              <a:solidFill>
-                <a:srgbClr val="7030A0"/>
-              </a:solidFill>
-            </a:endParaRPr>
           </a:p>
         </p:txBody>
       </p:sp>
@@ -14586,18 +13830,13 @@
           <a:lstStyle/>
           <a:p>
             <a:r>
-              <a:rPr lang="en-US" sz="1400" dirty="0" smtClean="0">
+              <a:rPr lang="en-US" sz="1400" dirty="0">
                 <a:solidFill>
                   <a:srgbClr val="FF00FF"/>
                 </a:solidFill>
               </a:rPr>
               <a:t>target=”router2”</a:t>
             </a:r>
-            <a:endParaRPr lang="en-US" sz="1400" dirty="0">
-              <a:solidFill>
-                <a:srgbClr val="FF00FF"/>
-              </a:solidFill>
-            </a:endParaRPr>
           </a:p>
         </p:txBody>
       </p:sp>
@@ -14611,13 +13850,6 @@
   <p:clrMapOvr>
     <a:masterClrMapping/>
   </p:clrMapOvr>
-  <p:timing>
-    <p:tnLst>
-      <p:par>
-        <p:cTn id="1" dur="indefinite" restart="never" nodeType="tmRoot"/>
-      </p:par>
-    </p:tnLst>
-  </p:timing>
 </p:sld>
 </file>
 

</xml_diff>